<commit_message>
[DEL] Generate pickle files
</commit_message>
<xml_diff>
--- a/DOC/Results_Final.pptx
+++ b/DOC/Results_Final.pptx
@@ -5,32 +5,33 @@
     <p:sldMasterId id="2147483648" r:id="rId4"/>
   </p:sldMasterIdLst>
   <p:notesMasterIdLst>
-    <p:notesMasterId r:id="rId25"/>
+    <p:notesMasterId r:id="rId26"/>
   </p:notesMasterIdLst>
   <p:handoutMasterIdLst>
-    <p:handoutMasterId r:id="rId26"/>
+    <p:handoutMasterId r:id="rId27"/>
   </p:handoutMasterIdLst>
   <p:sldIdLst>
     <p:sldId id="333" r:id="rId5"/>
-    <p:sldId id="321" r:id="rId6"/>
-    <p:sldId id="318" r:id="rId7"/>
-    <p:sldId id="319" r:id="rId8"/>
-    <p:sldId id="328" r:id="rId9"/>
-    <p:sldId id="317" r:id="rId10"/>
-    <p:sldId id="320" r:id="rId11"/>
-    <p:sldId id="322" r:id="rId12"/>
-    <p:sldId id="323" r:id="rId13"/>
-    <p:sldId id="324" r:id="rId14"/>
-    <p:sldId id="325" r:id="rId15"/>
-    <p:sldId id="326" r:id="rId16"/>
-    <p:sldId id="334" r:id="rId17"/>
-    <p:sldId id="335" r:id="rId18"/>
-    <p:sldId id="327" r:id="rId19"/>
-    <p:sldId id="329" r:id="rId20"/>
-    <p:sldId id="330" r:id="rId21"/>
-    <p:sldId id="331" r:id="rId22"/>
-    <p:sldId id="332" r:id="rId23"/>
-    <p:sldId id="336" r:id="rId24"/>
+    <p:sldId id="338" r:id="rId6"/>
+    <p:sldId id="321" r:id="rId7"/>
+    <p:sldId id="318" r:id="rId8"/>
+    <p:sldId id="319" r:id="rId9"/>
+    <p:sldId id="328" r:id="rId10"/>
+    <p:sldId id="317" r:id="rId11"/>
+    <p:sldId id="320" r:id="rId12"/>
+    <p:sldId id="322" r:id="rId13"/>
+    <p:sldId id="323" r:id="rId14"/>
+    <p:sldId id="324" r:id="rId15"/>
+    <p:sldId id="325" r:id="rId16"/>
+    <p:sldId id="326" r:id="rId17"/>
+    <p:sldId id="334" r:id="rId18"/>
+    <p:sldId id="335" r:id="rId19"/>
+    <p:sldId id="327" r:id="rId20"/>
+    <p:sldId id="329" r:id="rId21"/>
+    <p:sldId id="330" r:id="rId22"/>
+    <p:sldId id="331" r:id="rId23"/>
+    <p:sldId id="332" r:id="rId24"/>
+    <p:sldId id="336" r:id="rId25"/>
   </p:sldIdLst>
   <p:sldSz cx="12192000" cy="6858000"/>
   <p:notesSz cx="6858000" cy="9144000"/>
@@ -251,7 +252,7 @@
           <a:p>
             <a:fld id="{8CD26A2A-0A96-0647-84E5-C82F2EFD9474}" type="datetimeFigureOut">
               <a:rPr lang="en-US" smtClean="0"/>
-              <a:t>12/8/2023</a:t>
+              <a:t>12/10/2023</a:t>
             </a:fld>
             <a:endParaRPr lang="en-US" dirty="0"/>
           </a:p>
@@ -440,7 +441,7 @@
           <a:p>
             <a:fld id="{546253B2-FD87-4AAE-AF69-14FE02FB4D05}" type="datetimeFigureOut">
               <a:rPr lang="en-US" smtClean="0"/>
-              <a:t>12/8/2023</a:t>
+              <a:t>12/10/2023</a:t>
             </a:fld>
             <a:endParaRPr lang="en-US"/>
           </a:p>
@@ -22036,7 +22037,59 @@
                 </a:highlight>
                 <a:latin typeface="Consolas" panose="020B0609020204030204" pitchFamily="49" charset="0"/>
               </a:rPr>
-              <a:t>(5087066, 15) </a:t>
+              <a:t>(5087066, 15)</a:t>
+            </a:r>
+          </a:p>
+          <a:p>
+            <a:endParaRPr lang="en-SG" sz="2000" dirty="0">
+              <a:solidFill>
+                <a:srgbClr val="000000"/>
+              </a:solidFill>
+              <a:highlight>
+                <a:srgbClr val="D6E0EB"/>
+              </a:highlight>
+              <a:latin typeface="Consolas" panose="020B0609020204030204" pitchFamily="49" charset="0"/>
+            </a:endParaRPr>
+          </a:p>
+          <a:p>
+            <a:r>
+              <a:rPr lang="en-SG" sz="2000" b="0" i="0" dirty="0">
+                <a:solidFill>
+                  <a:srgbClr val="000000"/>
+                </a:solidFill>
+                <a:effectLst/>
+                <a:highlight>
+                  <a:srgbClr val="D6E0EB"/>
+                </a:highlight>
+                <a:latin typeface="Consolas" panose="020B0609020204030204" pitchFamily="49" charset="0"/>
+              </a:rPr>
+              <a:t>Try </a:t>
+            </a:r>
+            <a:r>
+              <a:rPr lang="en-SG" sz="2000" b="0" i="0" dirty="0" err="1">
+                <a:solidFill>
+                  <a:srgbClr val="000000"/>
+                </a:solidFill>
+                <a:effectLst/>
+                <a:highlight>
+                  <a:srgbClr val="D6E0EB"/>
+                </a:highlight>
+                <a:latin typeface="Consolas" panose="020B0609020204030204" pitchFamily="49" charset="0"/>
+              </a:rPr>
+              <a:t>xgboost</a:t>
+            </a:r>
+            <a:r>
+              <a:rPr lang="en-SG" sz="2000" b="0" i="0" dirty="0">
+                <a:solidFill>
+                  <a:srgbClr val="000000"/>
+                </a:solidFill>
+                <a:effectLst/>
+                <a:highlight>
+                  <a:srgbClr val="D6E0EB"/>
+                </a:highlight>
+                <a:latin typeface="Consolas" panose="020B0609020204030204" pitchFamily="49" charset="0"/>
+              </a:rPr>
+              <a:t> </a:t>
             </a:r>
           </a:p>
         </p:txBody>
@@ -22214,7 +22267,7 @@
           <p:cNvPr id="2" name="Picture Placeholder 1">
             <a:extLst>
               <a:ext uri="{FF2B5EF4-FFF2-40B4-BE49-F238E27FC236}">
-                <a16:creationId xmlns:a16="http://schemas.microsoft.com/office/drawing/2014/main" id="{266CD7DC-28F7-B409-48D9-E9189556D73C}"/>
+                <a16:creationId xmlns:a16="http://schemas.microsoft.com/office/drawing/2014/main" id="{2B470D0A-71F0-3443-34B3-EB485460BF74}"/>
               </a:ext>
             </a:extLst>
           </p:cNvPr>
@@ -22239,7 +22292,7 @@
           <p:cNvPr id="3" name="Text Placeholder 2">
             <a:extLst>
               <a:ext uri="{FF2B5EF4-FFF2-40B4-BE49-F238E27FC236}">
-                <a16:creationId xmlns:a16="http://schemas.microsoft.com/office/drawing/2014/main" id="{B32C1FD2-B9CE-3A97-514D-6BB7498D6383}"/>
+                <a16:creationId xmlns:a16="http://schemas.microsoft.com/office/drawing/2014/main" id="{7FA05528-E3CB-D8CF-12D1-10169480B229}"/>
               </a:ext>
             </a:extLst>
           </p:cNvPr>
@@ -22264,7 +22317,7 @@
           <p:cNvPr id="4" name="Title 3">
             <a:extLst>
               <a:ext uri="{FF2B5EF4-FFF2-40B4-BE49-F238E27FC236}">
-                <a16:creationId xmlns:a16="http://schemas.microsoft.com/office/drawing/2014/main" id="{2F2BF548-0D21-C9D4-CC71-40F4EB8684C8}"/>
+                <a16:creationId xmlns:a16="http://schemas.microsoft.com/office/drawing/2014/main" id="{6AD6850D-8C96-4EF6-D2D5-9BE72C51CC95}"/>
               </a:ext>
             </a:extLst>
           </p:cNvPr>
@@ -22289,7 +22342,7 @@
           <p:cNvPr id="5" name="Footer Placeholder 4">
             <a:extLst>
               <a:ext uri="{FF2B5EF4-FFF2-40B4-BE49-F238E27FC236}">
-                <a16:creationId xmlns:a16="http://schemas.microsoft.com/office/drawing/2014/main" id="{AA679346-9CE4-8F74-8503-61B026A76505}"/>
+                <a16:creationId xmlns:a16="http://schemas.microsoft.com/office/drawing/2014/main" id="{D7964E7F-0402-5809-9AE7-5B105B2F7F75}"/>
               </a:ext>
             </a:extLst>
           </p:cNvPr>
@@ -22313,12 +22366,64 @@
           </a:p>
         </p:txBody>
       </p:sp>
+      <p:sp>
+        <p:nvSpPr>
+          <p:cNvPr id="9" name="Rectangle: Rounded Corners 8">
+            <a:extLst>
+              <a:ext uri="{FF2B5EF4-FFF2-40B4-BE49-F238E27FC236}">
+                <a16:creationId xmlns:a16="http://schemas.microsoft.com/office/drawing/2014/main" id="{E5D3AEF8-3485-3EBD-1F2D-8D202841E56D}"/>
+              </a:ext>
+            </a:extLst>
+          </p:cNvPr>
+          <p:cNvSpPr/>
+          <p:nvPr/>
+        </p:nvSpPr>
+        <p:spPr>
+          <a:xfrm>
+            <a:off x="3390549" y="1263048"/>
+            <a:ext cx="536135" cy="655320"/>
+          </a:xfrm>
+          <a:prstGeom prst="roundRect">
+            <a:avLst/>
+          </a:prstGeom>
+          <a:noFill/>
+          <a:ln w="12700">
+            <a:solidFill>
+              <a:srgbClr val="00B050"/>
+            </a:solidFill>
+          </a:ln>
+        </p:spPr>
+        <p:style>
+          <a:lnRef idx="2">
+            <a:schemeClr val="accent1">
+              <a:shade val="15000"/>
+            </a:schemeClr>
+          </a:lnRef>
+          <a:fillRef idx="1">
+            <a:schemeClr val="accent1"/>
+          </a:fillRef>
+          <a:effectRef idx="0">
+            <a:schemeClr val="accent1"/>
+          </a:effectRef>
+          <a:fontRef idx="minor">
+            <a:schemeClr val="lt1"/>
+          </a:fontRef>
+        </p:style>
+        <p:txBody>
+          <a:bodyPr rtlCol="0" anchor="ctr"/>
+          <a:lstStyle/>
+          <a:p>
+            <a:pPr algn="ctr"/>
+            <a:endParaRPr lang="en-SG" dirty="0"/>
+          </a:p>
+        </p:txBody>
+      </p:sp>
       <p:pic>
         <p:nvPicPr>
-          <p:cNvPr id="9" name="Picture 8">
-            <a:extLst>
-              <a:ext uri="{FF2B5EF4-FFF2-40B4-BE49-F238E27FC236}">
-                <a16:creationId xmlns:a16="http://schemas.microsoft.com/office/drawing/2014/main" id="{62369F8F-384A-86E2-255B-FB452A38713A}"/>
+          <p:cNvPr id="11" name="Picture 10">
+            <a:extLst>
+              <a:ext uri="{FF2B5EF4-FFF2-40B4-BE49-F238E27FC236}">
+                <a16:creationId xmlns:a16="http://schemas.microsoft.com/office/drawing/2014/main" id="{D2BA6059-B90F-F71F-18A7-0944DDFDD034}"/>
               </a:ext>
             </a:extLst>
           </p:cNvPr>
@@ -22343,6 +22448,140 @@
           </a:prstGeom>
         </p:spPr>
       </p:pic>
+    </p:spTree>
+    <p:extLst>
+      <p:ext uri="{BB962C8B-B14F-4D97-AF65-F5344CB8AC3E}">
+        <p14:creationId xmlns:p14="http://schemas.microsoft.com/office/powerpoint/2010/main" val="3169333057"/>
+      </p:ext>
+    </p:extLst>
+  </p:cSld>
+  <p:clrMapOvr>
+    <a:masterClrMapping/>
+  </p:clrMapOvr>
+</p:sld>
+</file>
+
+<file path=ppt/slides/slide11.xml><?xml version="1.0" encoding="utf-8"?>
+<p:sld xmlns:a="http://schemas.openxmlformats.org/drawingml/2006/main" xmlns:r="http://schemas.openxmlformats.org/officeDocument/2006/relationships" xmlns:p="http://schemas.openxmlformats.org/presentationml/2006/main">
+  <p:cSld>
+    <p:spTree>
+      <p:nvGrpSpPr>
+        <p:cNvPr id="1" name=""/>
+        <p:cNvGrpSpPr/>
+        <p:nvPr/>
+      </p:nvGrpSpPr>
+      <p:grpSpPr>
+        <a:xfrm>
+          <a:off x="0" y="0"/>
+          <a:ext cx="0" cy="0"/>
+          <a:chOff x="0" y="0"/>
+          <a:chExt cx="0" cy="0"/>
+        </a:xfrm>
+      </p:grpSpPr>
+      <p:sp>
+        <p:nvSpPr>
+          <p:cNvPr id="2" name="Picture Placeholder 1">
+            <a:extLst>
+              <a:ext uri="{FF2B5EF4-FFF2-40B4-BE49-F238E27FC236}">
+                <a16:creationId xmlns:a16="http://schemas.microsoft.com/office/drawing/2014/main" id="{266CD7DC-28F7-B409-48D9-E9189556D73C}"/>
+              </a:ext>
+            </a:extLst>
+          </p:cNvPr>
+          <p:cNvSpPr>
+            <a:spLocks noGrp="1"/>
+          </p:cNvSpPr>
+          <p:nvPr>
+            <p:ph type="pic" sz="quarter" idx="48"/>
+          </p:nvPr>
+        </p:nvSpPr>
+        <p:spPr/>
+        <p:txBody>
+          <a:bodyPr/>
+          <a:lstStyle/>
+          <a:p>
+            <a:endParaRPr lang="en-SG"/>
+          </a:p>
+        </p:txBody>
+      </p:sp>
+      <p:sp>
+        <p:nvSpPr>
+          <p:cNvPr id="3" name="Text Placeholder 2">
+            <a:extLst>
+              <a:ext uri="{FF2B5EF4-FFF2-40B4-BE49-F238E27FC236}">
+                <a16:creationId xmlns:a16="http://schemas.microsoft.com/office/drawing/2014/main" id="{B32C1FD2-B9CE-3A97-514D-6BB7498D6383}"/>
+              </a:ext>
+            </a:extLst>
+          </p:cNvPr>
+          <p:cNvSpPr>
+            <a:spLocks noGrp="1"/>
+          </p:cNvSpPr>
+          <p:nvPr>
+            <p:ph type="body" sz="quarter" idx="28"/>
+          </p:nvPr>
+        </p:nvSpPr>
+        <p:spPr/>
+        <p:txBody>
+          <a:bodyPr/>
+          <a:lstStyle/>
+          <a:p>
+            <a:endParaRPr lang="en-SG"/>
+          </a:p>
+        </p:txBody>
+      </p:sp>
+      <p:sp>
+        <p:nvSpPr>
+          <p:cNvPr id="4" name="Title 3">
+            <a:extLst>
+              <a:ext uri="{FF2B5EF4-FFF2-40B4-BE49-F238E27FC236}">
+                <a16:creationId xmlns:a16="http://schemas.microsoft.com/office/drawing/2014/main" id="{2F2BF548-0D21-C9D4-CC71-40F4EB8684C8}"/>
+              </a:ext>
+            </a:extLst>
+          </p:cNvPr>
+          <p:cNvSpPr>
+            <a:spLocks noGrp="1"/>
+          </p:cNvSpPr>
+          <p:nvPr>
+            <p:ph type="title"/>
+          </p:nvPr>
+        </p:nvSpPr>
+        <p:spPr/>
+        <p:txBody>
+          <a:bodyPr/>
+          <a:lstStyle/>
+          <a:p>
+            <a:endParaRPr lang="en-SG"/>
+          </a:p>
+        </p:txBody>
+      </p:sp>
+      <p:sp>
+        <p:nvSpPr>
+          <p:cNvPr id="5" name="Footer Placeholder 4">
+            <a:extLst>
+              <a:ext uri="{FF2B5EF4-FFF2-40B4-BE49-F238E27FC236}">
+                <a16:creationId xmlns:a16="http://schemas.microsoft.com/office/drawing/2014/main" id="{AA679346-9CE4-8F74-8503-61B026A76505}"/>
+              </a:ext>
+            </a:extLst>
+          </p:cNvPr>
+          <p:cNvSpPr>
+            <a:spLocks noGrp="1"/>
+          </p:cNvSpPr>
+          <p:nvPr>
+            <p:ph type="ftr" sz="quarter" idx="49"/>
+          </p:nvPr>
+        </p:nvSpPr>
+        <p:spPr/>
+        <p:txBody>
+          <a:bodyPr/>
+          <a:lstStyle/>
+          <a:p>
+            <a:r>
+              <a:rPr lang="en-US" noProof="0"/>
+              <a:t>Presentation Title</a:t>
+            </a:r>
+            <a:endParaRPr lang="en-US" noProof="0" dirty="0"/>
+          </a:p>
+        </p:txBody>
+      </p:sp>
       <p:sp>
         <p:nvSpPr>
           <p:cNvPr id="10" name="Rectangle: Rounded Corners 9">
@@ -22395,146 +22634,12 @@
           </a:p>
         </p:txBody>
       </p:sp>
-    </p:spTree>
-    <p:extLst>
-      <p:ext uri="{BB962C8B-B14F-4D97-AF65-F5344CB8AC3E}">
-        <p14:creationId xmlns:p14="http://schemas.microsoft.com/office/powerpoint/2010/main" val="1816758370"/>
-      </p:ext>
-    </p:extLst>
-  </p:cSld>
-  <p:clrMapOvr>
-    <a:masterClrMapping/>
-  </p:clrMapOvr>
-</p:sld>
-</file>
-
-<file path=ppt/slides/slide11.xml><?xml version="1.0" encoding="utf-8"?>
-<p:sld xmlns:a="http://schemas.openxmlformats.org/drawingml/2006/main" xmlns:r="http://schemas.openxmlformats.org/officeDocument/2006/relationships" xmlns:p="http://schemas.openxmlformats.org/presentationml/2006/main">
-  <p:cSld>
-    <p:spTree>
-      <p:nvGrpSpPr>
-        <p:cNvPr id="1" name=""/>
-        <p:cNvGrpSpPr/>
-        <p:nvPr/>
-      </p:nvGrpSpPr>
-      <p:grpSpPr>
-        <a:xfrm>
-          <a:off x="0" y="0"/>
-          <a:ext cx="0" cy="0"/>
-          <a:chOff x="0" y="0"/>
-          <a:chExt cx="0" cy="0"/>
-        </a:xfrm>
-      </p:grpSpPr>
-      <p:sp>
-        <p:nvSpPr>
-          <p:cNvPr id="2" name="Picture Placeholder 1">
-            <a:extLst>
-              <a:ext uri="{FF2B5EF4-FFF2-40B4-BE49-F238E27FC236}">
-                <a16:creationId xmlns:a16="http://schemas.microsoft.com/office/drawing/2014/main" id="{ADDB7366-9C84-A3D5-FDA7-D8349373BDAB}"/>
-              </a:ext>
-            </a:extLst>
-          </p:cNvPr>
-          <p:cNvSpPr>
-            <a:spLocks noGrp="1"/>
-          </p:cNvSpPr>
-          <p:nvPr>
-            <p:ph type="pic" sz="quarter" idx="48"/>
-          </p:nvPr>
-        </p:nvSpPr>
-        <p:spPr/>
-        <p:txBody>
-          <a:bodyPr/>
-          <a:lstStyle/>
-          <a:p>
-            <a:endParaRPr lang="en-SG"/>
-          </a:p>
-        </p:txBody>
-      </p:sp>
-      <p:sp>
-        <p:nvSpPr>
-          <p:cNvPr id="3" name="Text Placeholder 2">
-            <a:extLst>
-              <a:ext uri="{FF2B5EF4-FFF2-40B4-BE49-F238E27FC236}">
-                <a16:creationId xmlns:a16="http://schemas.microsoft.com/office/drawing/2014/main" id="{F214C2A4-3378-A44A-886C-36C959A812AE}"/>
-              </a:ext>
-            </a:extLst>
-          </p:cNvPr>
-          <p:cNvSpPr>
-            <a:spLocks noGrp="1"/>
-          </p:cNvSpPr>
-          <p:nvPr>
-            <p:ph type="body" sz="quarter" idx="28"/>
-          </p:nvPr>
-        </p:nvSpPr>
-        <p:spPr/>
-        <p:txBody>
-          <a:bodyPr/>
-          <a:lstStyle/>
-          <a:p>
-            <a:endParaRPr lang="en-SG"/>
-          </a:p>
-        </p:txBody>
-      </p:sp>
-      <p:sp>
-        <p:nvSpPr>
-          <p:cNvPr id="4" name="Title 3">
-            <a:extLst>
-              <a:ext uri="{FF2B5EF4-FFF2-40B4-BE49-F238E27FC236}">
-                <a16:creationId xmlns:a16="http://schemas.microsoft.com/office/drawing/2014/main" id="{81C5D773-8D62-F677-89D8-5DFBC9142545}"/>
-              </a:ext>
-            </a:extLst>
-          </p:cNvPr>
-          <p:cNvSpPr>
-            <a:spLocks noGrp="1"/>
-          </p:cNvSpPr>
-          <p:nvPr>
-            <p:ph type="title"/>
-          </p:nvPr>
-        </p:nvSpPr>
-        <p:spPr/>
-        <p:txBody>
-          <a:bodyPr/>
-          <a:lstStyle/>
-          <a:p>
-            <a:endParaRPr lang="en-SG"/>
-          </a:p>
-        </p:txBody>
-      </p:sp>
-      <p:sp>
-        <p:nvSpPr>
-          <p:cNvPr id="5" name="Footer Placeholder 4">
-            <a:extLst>
-              <a:ext uri="{FF2B5EF4-FFF2-40B4-BE49-F238E27FC236}">
-                <a16:creationId xmlns:a16="http://schemas.microsoft.com/office/drawing/2014/main" id="{5BB18297-848D-C8CC-801C-39620A52163F}"/>
-              </a:ext>
-            </a:extLst>
-          </p:cNvPr>
-          <p:cNvSpPr>
-            <a:spLocks noGrp="1"/>
-          </p:cNvSpPr>
-          <p:nvPr>
-            <p:ph type="ftr" sz="quarter" idx="49"/>
-          </p:nvPr>
-        </p:nvSpPr>
-        <p:spPr/>
-        <p:txBody>
-          <a:bodyPr/>
-          <a:lstStyle/>
-          <a:p>
-            <a:r>
-              <a:rPr lang="en-US" noProof="0"/>
-              <a:t>Presentation Title</a:t>
-            </a:r>
-            <a:endParaRPr lang="en-US" noProof="0" dirty="0"/>
-          </a:p>
-        </p:txBody>
-      </p:sp>
       <p:pic>
         <p:nvPicPr>
-          <p:cNvPr id="7" name="Picture 6">
-            <a:extLst>
-              <a:ext uri="{FF2B5EF4-FFF2-40B4-BE49-F238E27FC236}">
-                <a16:creationId xmlns:a16="http://schemas.microsoft.com/office/drawing/2014/main" id="{638A009D-B53C-0042-0811-19B10FF55805}"/>
+          <p:cNvPr id="11" name="Picture 10">
+            <a:extLst>
+              <a:ext uri="{FF2B5EF4-FFF2-40B4-BE49-F238E27FC236}">
+                <a16:creationId xmlns:a16="http://schemas.microsoft.com/office/drawing/2014/main" id="{FD2A9931-1955-654B-BF58-C1047ADCF220}"/>
               </a:ext>
             </a:extLst>
           </p:cNvPr>
@@ -22559,6 +22664,140 @@
           </a:prstGeom>
         </p:spPr>
       </p:pic>
+    </p:spTree>
+    <p:extLst>
+      <p:ext uri="{BB962C8B-B14F-4D97-AF65-F5344CB8AC3E}">
+        <p14:creationId xmlns:p14="http://schemas.microsoft.com/office/powerpoint/2010/main" val="1816758370"/>
+      </p:ext>
+    </p:extLst>
+  </p:cSld>
+  <p:clrMapOvr>
+    <a:masterClrMapping/>
+  </p:clrMapOvr>
+</p:sld>
+</file>
+
+<file path=ppt/slides/slide12.xml><?xml version="1.0" encoding="utf-8"?>
+<p:sld xmlns:a="http://schemas.openxmlformats.org/drawingml/2006/main" xmlns:r="http://schemas.openxmlformats.org/officeDocument/2006/relationships" xmlns:p="http://schemas.openxmlformats.org/presentationml/2006/main">
+  <p:cSld>
+    <p:spTree>
+      <p:nvGrpSpPr>
+        <p:cNvPr id="1" name=""/>
+        <p:cNvGrpSpPr/>
+        <p:nvPr/>
+      </p:nvGrpSpPr>
+      <p:grpSpPr>
+        <a:xfrm>
+          <a:off x="0" y="0"/>
+          <a:ext cx="0" cy="0"/>
+          <a:chOff x="0" y="0"/>
+          <a:chExt cx="0" cy="0"/>
+        </a:xfrm>
+      </p:grpSpPr>
+      <p:sp>
+        <p:nvSpPr>
+          <p:cNvPr id="2" name="Picture Placeholder 1">
+            <a:extLst>
+              <a:ext uri="{FF2B5EF4-FFF2-40B4-BE49-F238E27FC236}">
+                <a16:creationId xmlns:a16="http://schemas.microsoft.com/office/drawing/2014/main" id="{ADDB7366-9C84-A3D5-FDA7-D8349373BDAB}"/>
+              </a:ext>
+            </a:extLst>
+          </p:cNvPr>
+          <p:cNvSpPr>
+            <a:spLocks noGrp="1"/>
+          </p:cNvSpPr>
+          <p:nvPr>
+            <p:ph type="pic" sz="quarter" idx="48"/>
+          </p:nvPr>
+        </p:nvSpPr>
+        <p:spPr/>
+        <p:txBody>
+          <a:bodyPr/>
+          <a:lstStyle/>
+          <a:p>
+            <a:endParaRPr lang="en-SG"/>
+          </a:p>
+        </p:txBody>
+      </p:sp>
+      <p:sp>
+        <p:nvSpPr>
+          <p:cNvPr id="3" name="Text Placeholder 2">
+            <a:extLst>
+              <a:ext uri="{FF2B5EF4-FFF2-40B4-BE49-F238E27FC236}">
+                <a16:creationId xmlns:a16="http://schemas.microsoft.com/office/drawing/2014/main" id="{F214C2A4-3378-A44A-886C-36C959A812AE}"/>
+              </a:ext>
+            </a:extLst>
+          </p:cNvPr>
+          <p:cNvSpPr>
+            <a:spLocks noGrp="1"/>
+          </p:cNvSpPr>
+          <p:nvPr>
+            <p:ph type="body" sz="quarter" idx="28"/>
+          </p:nvPr>
+        </p:nvSpPr>
+        <p:spPr/>
+        <p:txBody>
+          <a:bodyPr/>
+          <a:lstStyle/>
+          <a:p>
+            <a:endParaRPr lang="en-SG"/>
+          </a:p>
+        </p:txBody>
+      </p:sp>
+      <p:sp>
+        <p:nvSpPr>
+          <p:cNvPr id="4" name="Title 3">
+            <a:extLst>
+              <a:ext uri="{FF2B5EF4-FFF2-40B4-BE49-F238E27FC236}">
+                <a16:creationId xmlns:a16="http://schemas.microsoft.com/office/drawing/2014/main" id="{81C5D773-8D62-F677-89D8-5DFBC9142545}"/>
+              </a:ext>
+            </a:extLst>
+          </p:cNvPr>
+          <p:cNvSpPr>
+            <a:spLocks noGrp="1"/>
+          </p:cNvSpPr>
+          <p:nvPr>
+            <p:ph type="title"/>
+          </p:nvPr>
+        </p:nvSpPr>
+        <p:spPr/>
+        <p:txBody>
+          <a:bodyPr/>
+          <a:lstStyle/>
+          <a:p>
+            <a:endParaRPr lang="en-SG"/>
+          </a:p>
+        </p:txBody>
+      </p:sp>
+      <p:sp>
+        <p:nvSpPr>
+          <p:cNvPr id="5" name="Footer Placeholder 4">
+            <a:extLst>
+              <a:ext uri="{FF2B5EF4-FFF2-40B4-BE49-F238E27FC236}">
+                <a16:creationId xmlns:a16="http://schemas.microsoft.com/office/drawing/2014/main" id="{5BB18297-848D-C8CC-801C-39620A52163F}"/>
+              </a:ext>
+            </a:extLst>
+          </p:cNvPr>
+          <p:cNvSpPr>
+            <a:spLocks noGrp="1"/>
+          </p:cNvSpPr>
+          <p:nvPr>
+            <p:ph type="ftr" sz="quarter" idx="49"/>
+          </p:nvPr>
+        </p:nvSpPr>
+        <p:spPr/>
+        <p:txBody>
+          <a:bodyPr/>
+          <a:lstStyle/>
+          <a:p>
+            <a:r>
+              <a:rPr lang="en-US" noProof="0"/>
+              <a:t>Presentation Title</a:t>
+            </a:r>
+            <a:endParaRPr lang="en-US" noProof="0" dirty="0"/>
+          </a:p>
+        </p:txBody>
+      </p:sp>
       <p:sp>
         <p:nvSpPr>
           <p:cNvPr id="8" name="Rectangle: Rounded Corners 7">
@@ -22611,146 +22850,12 @@
           </a:p>
         </p:txBody>
       </p:sp>
-    </p:spTree>
-    <p:extLst>
-      <p:ext uri="{BB962C8B-B14F-4D97-AF65-F5344CB8AC3E}">
-        <p14:creationId xmlns:p14="http://schemas.microsoft.com/office/powerpoint/2010/main" val="639582657"/>
-      </p:ext>
-    </p:extLst>
-  </p:cSld>
-  <p:clrMapOvr>
-    <a:masterClrMapping/>
-  </p:clrMapOvr>
-</p:sld>
-</file>
-
-<file path=ppt/slides/slide12.xml><?xml version="1.0" encoding="utf-8"?>
-<p:sld xmlns:a="http://schemas.openxmlformats.org/drawingml/2006/main" xmlns:r="http://schemas.openxmlformats.org/officeDocument/2006/relationships" xmlns:p="http://schemas.openxmlformats.org/presentationml/2006/main">
-  <p:cSld>
-    <p:spTree>
-      <p:nvGrpSpPr>
-        <p:cNvPr id="1" name=""/>
-        <p:cNvGrpSpPr/>
-        <p:nvPr/>
-      </p:nvGrpSpPr>
-      <p:grpSpPr>
-        <a:xfrm>
-          <a:off x="0" y="0"/>
-          <a:ext cx="0" cy="0"/>
-          <a:chOff x="0" y="0"/>
-          <a:chExt cx="0" cy="0"/>
-        </a:xfrm>
-      </p:grpSpPr>
-      <p:sp>
-        <p:nvSpPr>
-          <p:cNvPr id="2" name="Picture Placeholder 1">
-            <a:extLst>
-              <a:ext uri="{FF2B5EF4-FFF2-40B4-BE49-F238E27FC236}">
-                <a16:creationId xmlns:a16="http://schemas.microsoft.com/office/drawing/2014/main" id="{B257CEED-A1DB-C0DA-8F9B-2497093B679B}"/>
-              </a:ext>
-            </a:extLst>
-          </p:cNvPr>
-          <p:cNvSpPr>
-            <a:spLocks noGrp="1"/>
-          </p:cNvSpPr>
-          <p:nvPr>
-            <p:ph type="pic" sz="quarter" idx="48"/>
-          </p:nvPr>
-        </p:nvSpPr>
-        <p:spPr/>
-        <p:txBody>
-          <a:bodyPr/>
-          <a:lstStyle/>
-          <a:p>
-            <a:endParaRPr lang="en-SG"/>
-          </a:p>
-        </p:txBody>
-      </p:sp>
-      <p:sp>
-        <p:nvSpPr>
-          <p:cNvPr id="3" name="Text Placeholder 2">
-            <a:extLst>
-              <a:ext uri="{FF2B5EF4-FFF2-40B4-BE49-F238E27FC236}">
-                <a16:creationId xmlns:a16="http://schemas.microsoft.com/office/drawing/2014/main" id="{7B01638A-875A-E2D6-A6A9-5CFE0E2C97D4}"/>
-              </a:ext>
-            </a:extLst>
-          </p:cNvPr>
-          <p:cNvSpPr>
-            <a:spLocks noGrp="1"/>
-          </p:cNvSpPr>
-          <p:nvPr>
-            <p:ph type="body" sz="quarter" idx="28"/>
-          </p:nvPr>
-        </p:nvSpPr>
-        <p:spPr/>
-        <p:txBody>
-          <a:bodyPr/>
-          <a:lstStyle/>
-          <a:p>
-            <a:endParaRPr lang="en-SG"/>
-          </a:p>
-        </p:txBody>
-      </p:sp>
-      <p:sp>
-        <p:nvSpPr>
-          <p:cNvPr id="4" name="Title 3">
-            <a:extLst>
-              <a:ext uri="{FF2B5EF4-FFF2-40B4-BE49-F238E27FC236}">
-                <a16:creationId xmlns:a16="http://schemas.microsoft.com/office/drawing/2014/main" id="{9C832853-E455-427E-0E68-3E4C0FBD27DA}"/>
-              </a:ext>
-            </a:extLst>
-          </p:cNvPr>
-          <p:cNvSpPr>
-            <a:spLocks noGrp="1"/>
-          </p:cNvSpPr>
-          <p:nvPr>
-            <p:ph type="title"/>
-          </p:nvPr>
-        </p:nvSpPr>
-        <p:spPr/>
-        <p:txBody>
-          <a:bodyPr/>
-          <a:lstStyle/>
-          <a:p>
-            <a:endParaRPr lang="en-SG"/>
-          </a:p>
-        </p:txBody>
-      </p:sp>
-      <p:sp>
-        <p:nvSpPr>
-          <p:cNvPr id="5" name="Footer Placeholder 4">
-            <a:extLst>
-              <a:ext uri="{FF2B5EF4-FFF2-40B4-BE49-F238E27FC236}">
-                <a16:creationId xmlns:a16="http://schemas.microsoft.com/office/drawing/2014/main" id="{A68E3CC1-1621-524D-0CB3-5DBEB2FC8EF9}"/>
-              </a:ext>
-            </a:extLst>
-          </p:cNvPr>
-          <p:cNvSpPr>
-            <a:spLocks noGrp="1"/>
-          </p:cNvSpPr>
-          <p:nvPr>
-            <p:ph type="ftr" sz="quarter" idx="49"/>
-          </p:nvPr>
-        </p:nvSpPr>
-        <p:spPr/>
-        <p:txBody>
-          <a:bodyPr/>
-          <a:lstStyle/>
-          <a:p>
-            <a:r>
-              <a:rPr lang="en-US" noProof="0"/>
-              <a:t>Presentation Title</a:t>
-            </a:r>
-            <a:endParaRPr lang="en-US" noProof="0" dirty="0"/>
-          </a:p>
-        </p:txBody>
-      </p:sp>
       <p:pic>
         <p:nvPicPr>
-          <p:cNvPr id="7" name="Picture 6">
-            <a:extLst>
-              <a:ext uri="{FF2B5EF4-FFF2-40B4-BE49-F238E27FC236}">
-                <a16:creationId xmlns:a16="http://schemas.microsoft.com/office/drawing/2014/main" id="{E5EA9FB1-8A80-8E4D-0A04-775C86139275}"/>
+          <p:cNvPr id="11" name="Picture 10">
+            <a:extLst>
+              <a:ext uri="{FF2B5EF4-FFF2-40B4-BE49-F238E27FC236}">
+                <a16:creationId xmlns:a16="http://schemas.microsoft.com/office/drawing/2014/main" id="{6DC74BA1-A34A-C11D-20B1-061CB5C27797}"/>
               </a:ext>
             </a:extLst>
           </p:cNvPr>
@@ -22767,8 +22872,8 @@
         </p:blipFill>
         <p:spPr>
           <a:xfrm>
-            <a:off x="0" y="361586"/>
-            <a:ext cx="12192000" cy="6134828"/>
+            <a:off x="190500" y="1143000"/>
+            <a:ext cx="11811000" cy="4572000"/>
           </a:xfrm>
           <a:prstGeom prst="rect">
             <a:avLst/>
@@ -22778,7 +22883,7 @@
     </p:spTree>
     <p:extLst>
       <p:ext uri="{BB962C8B-B14F-4D97-AF65-F5344CB8AC3E}">
-        <p14:creationId xmlns:p14="http://schemas.microsoft.com/office/powerpoint/2010/main" val="4220880466"/>
+        <p14:creationId xmlns:p14="http://schemas.microsoft.com/office/powerpoint/2010/main" val="639582657"/>
       </p:ext>
     </p:extLst>
   </p:cSld>
@@ -22810,6 +22915,170 @@
           <p:cNvPr id="2" name="Picture Placeholder 1">
             <a:extLst>
               <a:ext uri="{FF2B5EF4-FFF2-40B4-BE49-F238E27FC236}">
+                <a16:creationId xmlns:a16="http://schemas.microsoft.com/office/drawing/2014/main" id="{B257CEED-A1DB-C0DA-8F9B-2497093B679B}"/>
+              </a:ext>
+            </a:extLst>
+          </p:cNvPr>
+          <p:cNvSpPr>
+            <a:spLocks noGrp="1"/>
+          </p:cNvSpPr>
+          <p:nvPr>
+            <p:ph type="pic" sz="quarter" idx="48"/>
+          </p:nvPr>
+        </p:nvSpPr>
+        <p:spPr/>
+        <p:txBody>
+          <a:bodyPr/>
+          <a:lstStyle/>
+          <a:p>
+            <a:endParaRPr lang="en-SG"/>
+          </a:p>
+        </p:txBody>
+      </p:sp>
+      <p:sp>
+        <p:nvSpPr>
+          <p:cNvPr id="3" name="Text Placeholder 2">
+            <a:extLst>
+              <a:ext uri="{FF2B5EF4-FFF2-40B4-BE49-F238E27FC236}">
+                <a16:creationId xmlns:a16="http://schemas.microsoft.com/office/drawing/2014/main" id="{7B01638A-875A-E2D6-A6A9-5CFE0E2C97D4}"/>
+              </a:ext>
+            </a:extLst>
+          </p:cNvPr>
+          <p:cNvSpPr>
+            <a:spLocks noGrp="1"/>
+          </p:cNvSpPr>
+          <p:nvPr>
+            <p:ph type="body" sz="quarter" idx="28"/>
+          </p:nvPr>
+        </p:nvSpPr>
+        <p:spPr/>
+        <p:txBody>
+          <a:bodyPr/>
+          <a:lstStyle/>
+          <a:p>
+            <a:endParaRPr lang="en-SG"/>
+          </a:p>
+        </p:txBody>
+      </p:sp>
+      <p:sp>
+        <p:nvSpPr>
+          <p:cNvPr id="4" name="Title 3">
+            <a:extLst>
+              <a:ext uri="{FF2B5EF4-FFF2-40B4-BE49-F238E27FC236}">
+                <a16:creationId xmlns:a16="http://schemas.microsoft.com/office/drawing/2014/main" id="{9C832853-E455-427E-0E68-3E4C0FBD27DA}"/>
+              </a:ext>
+            </a:extLst>
+          </p:cNvPr>
+          <p:cNvSpPr>
+            <a:spLocks noGrp="1"/>
+          </p:cNvSpPr>
+          <p:nvPr>
+            <p:ph type="title"/>
+          </p:nvPr>
+        </p:nvSpPr>
+        <p:spPr/>
+        <p:txBody>
+          <a:bodyPr/>
+          <a:lstStyle/>
+          <a:p>
+            <a:endParaRPr lang="en-SG"/>
+          </a:p>
+        </p:txBody>
+      </p:sp>
+      <p:sp>
+        <p:nvSpPr>
+          <p:cNvPr id="5" name="Footer Placeholder 4">
+            <a:extLst>
+              <a:ext uri="{FF2B5EF4-FFF2-40B4-BE49-F238E27FC236}">
+                <a16:creationId xmlns:a16="http://schemas.microsoft.com/office/drawing/2014/main" id="{A68E3CC1-1621-524D-0CB3-5DBEB2FC8EF9}"/>
+              </a:ext>
+            </a:extLst>
+          </p:cNvPr>
+          <p:cNvSpPr>
+            <a:spLocks noGrp="1"/>
+          </p:cNvSpPr>
+          <p:nvPr>
+            <p:ph type="ftr" sz="quarter" idx="49"/>
+          </p:nvPr>
+        </p:nvSpPr>
+        <p:spPr/>
+        <p:txBody>
+          <a:bodyPr/>
+          <a:lstStyle/>
+          <a:p>
+            <a:r>
+              <a:rPr lang="en-US" noProof="0"/>
+              <a:t>Presentation Title</a:t>
+            </a:r>
+            <a:endParaRPr lang="en-US" noProof="0" dirty="0"/>
+          </a:p>
+        </p:txBody>
+      </p:sp>
+      <p:pic>
+        <p:nvPicPr>
+          <p:cNvPr id="8" name="Picture 7">
+            <a:extLst>
+              <a:ext uri="{FF2B5EF4-FFF2-40B4-BE49-F238E27FC236}">
+                <a16:creationId xmlns:a16="http://schemas.microsoft.com/office/drawing/2014/main" id="{3ACE549C-B0E2-4E73-3796-14B734C83649}"/>
+              </a:ext>
+            </a:extLst>
+          </p:cNvPr>
+          <p:cNvPicPr>
+            <a:picLocks noChangeAspect="1"/>
+          </p:cNvPicPr>
+          <p:nvPr/>
+        </p:nvPicPr>
+        <p:blipFill>
+          <a:blip r:embed="rId2"/>
+          <a:stretch>
+            <a:fillRect/>
+          </a:stretch>
+        </p:blipFill>
+        <p:spPr>
+          <a:xfrm>
+            <a:off x="0" y="2192584"/>
+            <a:ext cx="12192000" cy="2472832"/>
+          </a:xfrm>
+          <a:prstGeom prst="rect">
+            <a:avLst/>
+          </a:prstGeom>
+        </p:spPr>
+      </p:pic>
+    </p:spTree>
+    <p:extLst>
+      <p:ext uri="{BB962C8B-B14F-4D97-AF65-F5344CB8AC3E}">
+        <p14:creationId xmlns:p14="http://schemas.microsoft.com/office/powerpoint/2010/main" val="4220880466"/>
+      </p:ext>
+    </p:extLst>
+  </p:cSld>
+  <p:clrMapOvr>
+    <a:masterClrMapping/>
+  </p:clrMapOvr>
+</p:sld>
+</file>
+
+<file path=ppt/slides/slide14.xml><?xml version="1.0" encoding="utf-8"?>
+<p:sld xmlns:a="http://schemas.openxmlformats.org/drawingml/2006/main" xmlns:r="http://schemas.openxmlformats.org/officeDocument/2006/relationships" xmlns:p="http://schemas.openxmlformats.org/presentationml/2006/main">
+  <p:cSld>
+    <p:spTree>
+      <p:nvGrpSpPr>
+        <p:cNvPr id="1" name=""/>
+        <p:cNvGrpSpPr/>
+        <p:nvPr/>
+      </p:nvGrpSpPr>
+      <p:grpSpPr>
+        <a:xfrm>
+          <a:off x="0" y="0"/>
+          <a:ext cx="0" cy="0"/>
+          <a:chOff x="0" y="0"/>
+          <a:chExt cx="0" cy="0"/>
+        </a:xfrm>
+      </p:grpSpPr>
+      <p:sp>
+        <p:nvSpPr>
+          <p:cNvPr id="2" name="Picture Placeholder 1">
+            <a:extLst>
+              <a:ext uri="{FF2B5EF4-FFF2-40B4-BE49-F238E27FC236}">
                 <a16:creationId xmlns:a16="http://schemas.microsoft.com/office/drawing/2014/main" id="{6023CE9B-E202-1A33-EB96-5D8D78F49B4D}"/>
               </a:ext>
             </a:extLst>
@@ -24178,7 +24447,7 @@
 </p:sld>
 </file>
 
-<file path=ppt/slides/slide14.xml><?xml version="1.0" encoding="utf-8"?>
+<file path=ppt/slides/slide15.xml><?xml version="1.0" encoding="utf-8"?>
 <p:sld xmlns:a="http://schemas.openxmlformats.org/drawingml/2006/main" xmlns:r="http://schemas.openxmlformats.org/officeDocument/2006/relationships" xmlns:p="http://schemas.openxmlformats.org/presentationml/2006/main">
   <p:cSld>
     <p:spTree>
@@ -24397,7 +24666,7 @@
 </p:sld>
 </file>
 
-<file path=ppt/slides/slide15.xml><?xml version="1.0" encoding="utf-8"?>
+<file path=ppt/slides/slide16.xml><?xml version="1.0" encoding="utf-8"?>
 <p:sld xmlns:a="http://schemas.openxmlformats.org/drawingml/2006/main" xmlns:r="http://schemas.openxmlformats.org/officeDocument/2006/relationships" xmlns:p="http://schemas.openxmlformats.org/presentationml/2006/main">
   <p:cSld>
     <p:spTree>
@@ -24598,7 +24867,7 @@
 </p:sld>
 </file>
 
-<file path=ppt/slides/slide16.xml><?xml version="1.0" encoding="utf-8"?>
+<file path=ppt/slides/slide17.xml><?xml version="1.0" encoding="utf-8"?>
 <p:sld xmlns:a="http://schemas.openxmlformats.org/drawingml/2006/main" xmlns:r="http://schemas.openxmlformats.org/officeDocument/2006/relationships" xmlns:p="http://schemas.openxmlformats.org/presentationml/2006/main">
   <p:cSld>
     <p:spTree>
@@ -24765,7 +25034,7 @@
 </p:sld>
 </file>
 
-<file path=ppt/slides/slide17.xml><?xml version="1.0" encoding="utf-8"?>
+<file path=ppt/slides/slide18.xml><?xml version="1.0" encoding="utf-8"?>
 <p:sld xmlns:a="http://schemas.openxmlformats.org/drawingml/2006/main" xmlns:r="http://schemas.openxmlformats.org/officeDocument/2006/relationships" xmlns:p="http://schemas.openxmlformats.org/presentationml/2006/main">
   <p:cSld>
     <p:spTree>
@@ -24989,7 +25258,7 @@
 </p:sld>
 </file>
 
-<file path=ppt/slides/slide18.xml><?xml version="1.0" encoding="utf-8"?>
+<file path=ppt/slides/slide19.xml><?xml version="1.0" encoding="utf-8"?>
 <p:sld xmlns:a="http://schemas.openxmlformats.org/drawingml/2006/main" xmlns:r="http://schemas.openxmlformats.org/officeDocument/2006/relationships" xmlns:p="http://schemas.openxmlformats.org/presentationml/2006/main">
   <p:cSld>
     <p:spTree>
@@ -25213,7 +25482,249 @@
 </p:sld>
 </file>
 
-<file path=ppt/slides/slide19.xml><?xml version="1.0" encoding="utf-8"?>
+<file path=ppt/slides/slide2.xml><?xml version="1.0" encoding="utf-8"?>
+<p:sld xmlns:a="http://schemas.openxmlformats.org/drawingml/2006/main" xmlns:r="http://schemas.openxmlformats.org/officeDocument/2006/relationships" xmlns:p="http://schemas.openxmlformats.org/presentationml/2006/main">
+  <p:cSld>
+    <p:spTree>
+      <p:nvGrpSpPr>
+        <p:cNvPr id="1" name=""/>
+        <p:cNvGrpSpPr/>
+        <p:nvPr/>
+      </p:nvGrpSpPr>
+      <p:grpSpPr>
+        <a:xfrm>
+          <a:off x="0" y="0"/>
+          <a:ext cx="0" cy="0"/>
+          <a:chOff x="0" y="0"/>
+          <a:chExt cx="0" cy="0"/>
+        </a:xfrm>
+      </p:grpSpPr>
+      <p:sp>
+        <p:nvSpPr>
+          <p:cNvPr id="2" name="Picture Placeholder 1">
+            <a:extLst>
+              <a:ext uri="{FF2B5EF4-FFF2-40B4-BE49-F238E27FC236}">
+                <a16:creationId xmlns:a16="http://schemas.microsoft.com/office/drawing/2014/main" id="{6023CE9B-E202-1A33-EB96-5D8D78F49B4D}"/>
+              </a:ext>
+            </a:extLst>
+          </p:cNvPr>
+          <p:cNvSpPr>
+            <a:spLocks noGrp="1"/>
+          </p:cNvSpPr>
+          <p:nvPr>
+            <p:ph type="pic" sz="quarter" idx="48"/>
+          </p:nvPr>
+        </p:nvSpPr>
+        <p:spPr/>
+        <p:txBody>
+          <a:bodyPr/>
+          <a:lstStyle/>
+          <a:p>
+            <a:endParaRPr lang="en-SG"/>
+          </a:p>
+        </p:txBody>
+      </p:sp>
+      <p:sp>
+        <p:nvSpPr>
+          <p:cNvPr id="3" name="Text Placeholder 2">
+            <a:extLst>
+              <a:ext uri="{FF2B5EF4-FFF2-40B4-BE49-F238E27FC236}">
+                <a16:creationId xmlns:a16="http://schemas.microsoft.com/office/drawing/2014/main" id="{8001575A-D071-E5C9-BE33-D45296FF2546}"/>
+              </a:ext>
+            </a:extLst>
+          </p:cNvPr>
+          <p:cNvSpPr>
+            <a:spLocks noGrp="1"/>
+          </p:cNvSpPr>
+          <p:nvPr>
+            <p:ph type="body" sz="quarter" idx="28"/>
+          </p:nvPr>
+        </p:nvSpPr>
+        <p:spPr>
+          <a:xfrm>
+            <a:off x="368136" y="1312352"/>
+            <a:ext cx="11612369" cy="4808529"/>
+          </a:xfrm>
+        </p:spPr>
+        <p:txBody>
+          <a:bodyPr/>
+          <a:lstStyle/>
+          <a:p>
+            <a:endParaRPr lang="en-SG" dirty="0">
+              <a:highlight>
+                <a:srgbClr val="D6E0EB"/>
+              </a:highlight>
+            </a:endParaRPr>
+          </a:p>
+        </p:txBody>
+      </p:sp>
+      <p:sp>
+        <p:nvSpPr>
+          <p:cNvPr id="4" name="Title 3">
+            <a:extLst>
+              <a:ext uri="{FF2B5EF4-FFF2-40B4-BE49-F238E27FC236}">
+                <a16:creationId xmlns:a16="http://schemas.microsoft.com/office/drawing/2014/main" id="{71E87949-5C43-3ED6-5168-4CEE07D04D78}"/>
+              </a:ext>
+            </a:extLst>
+          </p:cNvPr>
+          <p:cNvSpPr>
+            <a:spLocks noGrp="1"/>
+          </p:cNvSpPr>
+          <p:nvPr>
+            <p:ph type="title"/>
+          </p:nvPr>
+        </p:nvSpPr>
+        <p:spPr>
+          <a:xfrm>
+            <a:off x="368137" y="379439"/>
+            <a:ext cx="9823998" cy="1325563"/>
+          </a:xfrm>
+        </p:spPr>
+        <p:txBody>
+          <a:bodyPr/>
+          <a:lstStyle/>
+          <a:p>
+            <a:r>
+              <a:rPr lang="en-US" dirty="0"/>
+              <a:t>weights = 0: 0.1 , 1: 99.9</a:t>
+            </a:r>
+            <a:endParaRPr lang="en-SG" dirty="0"/>
+          </a:p>
+        </p:txBody>
+      </p:sp>
+      <p:sp>
+        <p:nvSpPr>
+          <p:cNvPr id="5" name="Footer Placeholder 4">
+            <a:extLst>
+              <a:ext uri="{FF2B5EF4-FFF2-40B4-BE49-F238E27FC236}">
+                <a16:creationId xmlns:a16="http://schemas.microsoft.com/office/drawing/2014/main" id="{5E6C7A0E-F720-87D7-F168-209155662DE4}"/>
+              </a:ext>
+            </a:extLst>
+          </p:cNvPr>
+          <p:cNvSpPr>
+            <a:spLocks noGrp="1"/>
+          </p:cNvSpPr>
+          <p:nvPr>
+            <p:ph type="ftr" sz="quarter" idx="49"/>
+          </p:nvPr>
+        </p:nvSpPr>
+        <p:spPr/>
+        <p:txBody>
+          <a:bodyPr/>
+          <a:lstStyle/>
+          <a:p>
+            <a:r>
+              <a:rPr lang="en-US" noProof="0"/>
+              <a:t>Presentation Title</a:t>
+            </a:r>
+            <a:endParaRPr lang="en-US" noProof="0" dirty="0"/>
+          </a:p>
+        </p:txBody>
+      </p:sp>
+      <p:pic>
+        <p:nvPicPr>
+          <p:cNvPr id="7" name="Picture 6">
+            <a:extLst>
+              <a:ext uri="{FF2B5EF4-FFF2-40B4-BE49-F238E27FC236}">
+                <a16:creationId xmlns:a16="http://schemas.microsoft.com/office/drawing/2014/main" id="{7E2B82B4-CF16-52CB-F58E-9A4AFD78EED4}"/>
+              </a:ext>
+            </a:extLst>
+          </p:cNvPr>
+          <p:cNvPicPr>
+            <a:picLocks noChangeAspect="1"/>
+          </p:cNvPicPr>
+          <p:nvPr/>
+        </p:nvPicPr>
+        <p:blipFill>
+          <a:blip r:embed="rId2"/>
+          <a:stretch>
+            <a:fillRect/>
+          </a:stretch>
+        </p:blipFill>
+        <p:spPr>
+          <a:xfrm>
+            <a:off x="1232005" y="1252538"/>
+            <a:ext cx="4250877" cy="5147944"/>
+          </a:xfrm>
+          <a:prstGeom prst="rect">
+            <a:avLst/>
+          </a:prstGeom>
+        </p:spPr>
+      </p:pic>
+      <p:pic>
+        <p:nvPicPr>
+          <p:cNvPr id="9" name="Picture 8">
+            <a:extLst>
+              <a:ext uri="{FF2B5EF4-FFF2-40B4-BE49-F238E27FC236}">
+                <a16:creationId xmlns:a16="http://schemas.microsoft.com/office/drawing/2014/main" id="{07D59B50-5AA8-C111-C3FB-01C592E3F99D}"/>
+              </a:ext>
+            </a:extLst>
+          </p:cNvPr>
+          <p:cNvPicPr>
+            <a:picLocks noChangeAspect="1"/>
+          </p:cNvPicPr>
+          <p:nvPr/>
+        </p:nvPicPr>
+        <p:blipFill>
+          <a:blip r:embed="rId3"/>
+          <a:stretch>
+            <a:fillRect/>
+          </a:stretch>
+        </p:blipFill>
+        <p:spPr>
+          <a:xfrm>
+            <a:off x="6230256" y="1215313"/>
+            <a:ext cx="4344568" cy="5147944"/>
+          </a:xfrm>
+          <a:prstGeom prst="rect">
+            <a:avLst/>
+          </a:prstGeom>
+        </p:spPr>
+      </p:pic>
+      <p:pic>
+        <p:nvPicPr>
+          <p:cNvPr id="11" name="Picture 10">
+            <a:extLst>
+              <a:ext uri="{FF2B5EF4-FFF2-40B4-BE49-F238E27FC236}">
+                <a16:creationId xmlns:a16="http://schemas.microsoft.com/office/drawing/2014/main" id="{58DDACCE-4D01-C919-4D47-B194997C0EAE}"/>
+              </a:ext>
+            </a:extLst>
+          </p:cNvPr>
+          <p:cNvPicPr>
+            <a:picLocks noChangeAspect="1"/>
+          </p:cNvPicPr>
+          <p:nvPr/>
+        </p:nvPicPr>
+        <p:blipFill>
+          <a:blip r:embed="rId4"/>
+          <a:stretch>
+            <a:fillRect/>
+          </a:stretch>
+        </p:blipFill>
+        <p:spPr>
+          <a:xfrm>
+            <a:off x="-121298" y="1616983"/>
+            <a:ext cx="12192000" cy="5241017"/>
+          </a:xfrm>
+          <a:prstGeom prst="rect">
+            <a:avLst/>
+          </a:prstGeom>
+        </p:spPr>
+      </p:pic>
+    </p:spTree>
+    <p:extLst>
+      <p:ext uri="{BB962C8B-B14F-4D97-AF65-F5344CB8AC3E}">
+        <p14:creationId xmlns:p14="http://schemas.microsoft.com/office/powerpoint/2010/main" val="1411012241"/>
+      </p:ext>
+    </p:extLst>
+  </p:cSld>
+  <p:clrMapOvr>
+    <a:masterClrMapping/>
+  </p:clrMapOvr>
+</p:sld>
+</file>
+
+<file path=ppt/slides/slide20.xml><?xml version="1.0" encoding="utf-8"?>
 <p:sld xmlns:a="http://schemas.openxmlformats.org/drawingml/2006/main" xmlns:r="http://schemas.openxmlformats.org/officeDocument/2006/relationships" xmlns:p="http://schemas.openxmlformats.org/presentationml/2006/main">
   <p:cSld>
     <p:spTree>
@@ -25467,1455 +25978,7 @@
 </p:sld>
 </file>
 
-<file path=ppt/slides/slide2.xml><?xml version="1.0" encoding="utf-8"?>
-<p:sld xmlns:a="http://schemas.openxmlformats.org/drawingml/2006/main" xmlns:r="http://schemas.openxmlformats.org/officeDocument/2006/relationships" xmlns:p="http://schemas.openxmlformats.org/presentationml/2006/main">
-  <p:cSld>
-    <p:spTree>
-      <p:nvGrpSpPr>
-        <p:cNvPr id="1" name=""/>
-        <p:cNvGrpSpPr/>
-        <p:nvPr/>
-      </p:nvGrpSpPr>
-      <p:grpSpPr>
-        <a:xfrm>
-          <a:off x="0" y="0"/>
-          <a:ext cx="0" cy="0"/>
-          <a:chOff x="0" y="0"/>
-          <a:chExt cx="0" cy="0"/>
-        </a:xfrm>
-      </p:grpSpPr>
-      <p:sp>
-        <p:nvSpPr>
-          <p:cNvPr id="2" name="Picture Placeholder 1">
-            <a:extLst>
-              <a:ext uri="{FF2B5EF4-FFF2-40B4-BE49-F238E27FC236}">
-                <a16:creationId xmlns:a16="http://schemas.microsoft.com/office/drawing/2014/main" id="{6023CE9B-E202-1A33-EB96-5D8D78F49B4D}"/>
-              </a:ext>
-            </a:extLst>
-          </p:cNvPr>
-          <p:cNvSpPr>
-            <a:spLocks noGrp="1"/>
-          </p:cNvSpPr>
-          <p:nvPr>
-            <p:ph type="pic" sz="quarter" idx="48"/>
-          </p:nvPr>
-        </p:nvSpPr>
-        <p:spPr/>
-        <p:txBody>
-          <a:bodyPr/>
-          <a:lstStyle/>
-          <a:p>
-            <a:endParaRPr lang="en-SG"/>
-          </a:p>
-        </p:txBody>
-      </p:sp>
-      <p:sp>
-        <p:nvSpPr>
-          <p:cNvPr id="3" name="Text Placeholder 2">
-            <a:extLst>
-              <a:ext uri="{FF2B5EF4-FFF2-40B4-BE49-F238E27FC236}">
-                <a16:creationId xmlns:a16="http://schemas.microsoft.com/office/drawing/2014/main" id="{8001575A-D071-E5C9-BE33-D45296FF2546}"/>
-              </a:ext>
-            </a:extLst>
-          </p:cNvPr>
-          <p:cNvSpPr>
-            <a:spLocks noGrp="1"/>
-          </p:cNvSpPr>
-          <p:nvPr>
-            <p:ph type="body" sz="quarter" idx="28"/>
-          </p:nvPr>
-        </p:nvSpPr>
-        <p:spPr>
-          <a:xfrm>
-            <a:off x="368136" y="1312352"/>
-            <a:ext cx="11612369" cy="4808529"/>
-          </a:xfrm>
-        </p:spPr>
-        <p:txBody>
-          <a:bodyPr/>
-          <a:lstStyle/>
-          <a:p>
-            <a:r>
-              <a:rPr lang="en-SG" b="0" dirty="0">
-                <a:solidFill>
-                  <a:srgbClr val="000000"/>
-                </a:solidFill>
-                <a:effectLst/>
-                <a:highlight>
-                  <a:srgbClr val="D6E0EB"/>
-                </a:highlight>
-                <a:latin typeface="Consolas" panose="020B0609020204030204" pitchFamily="49" charset="0"/>
-              </a:rPr>
-              <a:t>    </a:t>
-            </a:r>
-            <a:r>
-              <a:rPr lang="en-SG" b="0" dirty="0">
-                <a:solidFill>
-                  <a:srgbClr val="008000"/>
-                </a:solidFill>
-                <a:effectLst/>
-                <a:highlight>
-                  <a:srgbClr val="D6E0EB"/>
-                </a:highlight>
-                <a:latin typeface="Consolas" panose="020B0609020204030204" pitchFamily="49" charset="0"/>
-              </a:rPr>
-              <a:t># # UNDERSAMPLE - Most efficient with still high accuracy</a:t>
-            </a:r>
-            <a:endParaRPr lang="en-SG" b="0" dirty="0">
-              <a:solidFill>
-                <a:srgbClr val="000000"/>
-              </a:solidFill>
-              <a:effectLst/>
-              <a:highlight>
-                <a:srgbClr val="D6E0EB"/>
-              </a:highlight>
-              <a:latin typeface="Consolas" panose="020B0609020204030204" pitchFamily="49" charset="0"/>
-            </a:endParaRPr>
-          </a:p>
-          <a:p>
-            <a:r>
-              <a:rPr lang="en-SG" b="0" dirty="0">
-                <a:solidFill>
-                  <a:srgbClr val="000000"/>
-                </a:solidFill>
-                <a:effectLst/>
-                <a:highlight>
-                  <a:srgbClr val="D6E0EB"/>
-                </a:highlight>
-                <a:latin typeface="Consolas" panose="020B0609020204030204" pitchFamily="49" charset="0"/>
-              </a:rPr>
-              <a:t>    </a:t>
-            </a:r>
-            <a:r>
-              <a:rPr lang="en-SG" b="0" dirty="0" err="1">
-                <a:solidFill>
-                  <a:srgbClr val="001080"/>
-                </a:solidFill>
-                <a:effectLst/>
-                <a:highlight>
-                  <a:srgbClr val="D6E0EB"/>
-                </a:highlight>
-                <a:latin typeface="Consolas" panose="020B0609020204030204" pitchFamily="49" charset="0"/>
-              </a:rPr>
-              <a:t>sampling_method</a:t>
-            </a:r>
-            <a:r>
-              <a:rPr lang="en-SG" b="0" dirty="0">
-                <a:solidFill>
-                  <a:srgbClr val="000000"/>
-                </a:solidFill>
-                <a:effectLst/>
-                <a:highlight>
-                  <a:srgbClr val="D6E0EB"/>
-                </a:highlight>
-                <a:latin typeface="Consolas" panose="020B0609020204030204" pitchFamily="49" charset="0"/>
-              </a:rPr>
-              <a:t>=</a:t>
-            </a:r>
-            <a:r>
-              <a:rPr lang="en-SG" b="0" dirty="0">
-                <a:solidFill>
-                  <a:srgbClr val="098658"/>
-                </a:solidFill>
-                <a:effectLst/>
-                <a:highlight>
-                  <a:srgbClr val="D6E0EB"/>
-                </a:highlight>
-                <a:latin typeface="Consolas" panose="020B0609020204030204" pitchFamily="49" charset="0"/>
-              </a:rPr>
-              <a:t>0</a:t>
-            </a:r>
-            <a:endParaRPr lang="en-SG" b="0" dirty="0">
-              <a:solidFill>
-                <a:srgbClr val="000000"/>
-              </a:solidFill>
-              <a:effectLst/>
-              <a:highlight>
-                <a:srgbClr val="D6E0EB"/>
-              </a:highlight>
-              <a:latin typeface="Consolas" panose="020B0609020204030204" pitchFamily="49" charset="0"/>
-            </a:endParaRPr>
-          </a:p>
-          <a:p>
-            <a:r>
-              <a:rPr lang="en-SG" b="0" dirty="0">
-                <a:solidFill>
-                  <a:srgbClr val="000000"/>
-                </a:solidFill>
-                <a:effectLst/>
-                <a:highlight>
-                  <a:srgbClr val="D6E0EB"/>
-                </a:highlight>
-                <a:latin typeface="Consolas" panose="020B0609020204030204" pitchFamily="49" charset="0"/>
-              </a:rPr>
-              <a:t>    </a:t>
-            </a:r>
-            <a:r>
-              <a:rPr lang="en-SG" b="0" dirty="0" err="1">
-                <a:solidFill>
-                  <a:srgbClr val="001080"/>
-                </a:solidFill>
-                <a:effectLst/>
-                <a:highlight>
-                  <a:srgbClr val="D6E0EB"/>
-                </a:highlight>
-                <a:latin typeface="Consolas" panose="020B0609020204030204" pitchFamily="49" charset="0"/>
-              </a:rPr>
-              <a:t>sampling_strategy</a:t>
-            </a:r>
-            <a:r>
-              <a:rPr lang="en-SG" b="0" dirty="0">
-                <a:solidFill>
-                  <a:srgbClr val="000000"/>
-                </a:solidFill>
-                <a:effectLst/>
-                <a:highlight>
-                  <a:srgbClr val="D6E0EB"/>
-                </a:highlight>
-                <a:latin typeface="Consolas" panose="020B0609020204030204" pitchFamily="49" charset="0"/>
-              </a:rPr>
-              <a:t>=</a:t>
-            </a:r>
-            <a:r>
-              <a:rPr lang="en-SG" b="0" dirty="0">
-                <a:solidFill>
-                  <a:srgbClr val="098658"/>
-                </a:solidFill>
-                <a:effectLst/>
-                <a:highlight>
-                  <a:srgbClr val="D6E0EB"/>
-                </a:highlight>
-                <a:latin typeface="Consolas" panose="020B0609020204030204" pitchFamily="49" charset="0"/>
-              </a:rPr>
-              <a:t>.42</a:t>
-            </a:r>
-            <a:endParaRPr lang="en-SG" b="0" dirty="0">
-              <a:solidFill>
-                <a:srgbClr val="000000"/>
-              </a:solidFill>
-              <a:effectLst/>
-              <a:highlight>
-                <a:srgbClr val="D6E0EB"/>
-              </a:highlight>
-              <a:latin typeface="Consolas" panose="020B0609020204030204" pitchFamily="49" charset="0"/>
-            </a:endParaRPr>
-          </a:p>
-          <a:p>
-            <a:r>
-              <a:rPr lang="en-SG" b="0" dirty="0">
-                <a:solidFill>
-                  <a:srgbClr val="000000"/>
-                </a:solidFill>
-                <a:effectLst/>
-                <a:highlight>
-                  <a:srgbClr val="D6E0EB"/>
-                </a:highlight>
-                <a:latin typeface="Consolas" panose="020B0609020204030204" pitchFamily="49" charset="0"/>
-              </a:rPr>
-              <a:t>    </a:t>
-            </a:r>
-            <a:r>
-              <a:rPr lang="en-SG" b="0" dirty="0" err="1">
-                <a:solidFill>
-                  <a:srgbClr val="001080"/>
-                </a:solidFill>
-                <a:effectLst/>
-                <a:highlight>
-                  <a:srgbClr val="D6E0EB"/>
-                </a:highlight>
-                <a:latin typeface="Consolas" panose="020B0609020204030204" pitchFamily="49" charset="0"/>
-              </a:rPr>
-              <a:t>x_oversample</a:t>
-            </a:r>
-            <a:r>
-              <a:rPr lang="en-SG" b="0" dirty="0">
-                <a:solidFill>
-                  <a:srgbClr val="000000"/>
-                </a:solidFill>
-                <a:effectLst/>
-                <a:highlight>
-                  <a:srgbClr val="D6E0EB"/>
-                </a:highlight>
-                <a:latin typeface="Consolas" panose="020B0609020204030204" pitchFamily="49" charset="0"/>
-              </a:rPr>
-              <a:t>, </a:t>
-            </a:r>
-            <a:r>
-              <a:rPr lang="en-SG" b="0" dirty="0" err="1">
-                <a:solidFill>
-                  <a:srgbClr val="001080"/>
-                </a:solidFill>
-                <a:effectLst/>
-                <a:highlight>
-                  <a:srgbClr val="D6E0EB"/>
-                </a:highlight>
-                <a:latin typeface="Consolas" panose="020B0609020204030204" pitchFamily="49" charset="0"/>
-              </a:rPr>
-              <a:t>y_oversample</a:t>
-            </a:r>
-            <a:r>
-              <a:rPr lang="en-SG" b="0" dirty="0">
-                <a:solidFill>
-                  <a:srgbClr val="000000"/>
-                </a:solidFill>
-                <a:effectLst/>
-                <a:highlight>
-                  <a:srgbClr val="D6E0EB"/>
-                </a:highlight>
-                <a:latin typeface="Consolas" panose="020B0609020204030204" pitchFamily="49" charset="0"/>
-              </a:rPr>
-              <a:t> = </a:t>
-            </a:r>
-            <a:r>
-              <a:rPr lang="en-SG" b="0" dirty="0" err="1">
-                <a:solidFill>
-                  <a:srgbClr val="795E26"/>
-                </a:solidFill>
-                <a:effectLst/>
-                <a:highlight>
-                  <a:srgbClr val="D6E0EB"/>
-                </a:highlight>
-                <a:latin typeface="Consolas" panose="020B0609020204030204" pitchFamily="49" charset="0"/>
-              </a:rPr>
-              <a:t>sample_imbalanced_data</a:t>
-            </a:r>
-            <a:r>
-              <a:rPr lang="en-SG" b="0" dirty="0">
-                <a:solidFill>
-                  <a:srgbClr val="000000"/>
-                </a:solidFill>
-                <a:effectLst/>
-                <a:highlight>
-                  <a:srgbClr val="D6E0EB"/>
-                </a:highlight>
-                <a:latin typeface="Consolas" panose="020B0609020204030204" pitchFamily="49" charset="0"/>
-              </a:rPr>
-              <a:t>(</a:t>
-            </a:r>
-            <a:r>
-              <a:rPr lang="en-SG" b="0" dirty="0" err="1">
-                <a:solidFill>
-                  <a:srgbClr val="001080"/>
-                </a:solidFill>
-                <a:effectLst/>
-                <a:highlight>
-                  <a:srgbClr val="D6E0EB"/>
-                </a:highlight>
-                <a:latin typeface="Consolas" panose="020B0609020204030204" pitchFamily="49" charset="0"/>
-              </a:rPr>
-              <a:t>X_train</a:t>
-            </a:r>
-            <a:r>
-              <a:rPr lang="en-SG" b="0" dirty="0" err="1">
-                <a:solidFill>
-                  <a:srgbClr val="000000"/>
-                </a:solidFill>
-                <a:effectLst/>
-                <a:highlight>
-                  <a:srgbClr val="D6E0EB"/>
-                </a:highlight>
-                <a:latin typeface="Consolas" panose="020B0609020204030204" pitchFamily="49" charset="0"/>
-              </a:rPr>
-              <a:t>,</a:t>
-            </a:r>
-            <a:r>
-              <a:rPr lang="en-SG" b="0" dirty="0" err="1">
-                <a:solidFill>
-                  <a:srgbClr val="001080"/>
-                </a:solidFill>
-                <a:effectLst/>
-                <a:highlight>
-                  <a:srgbClr val="D6E0EB"/>
-                </a:highlight>
-                <a:latin typeface="Consolas" panose="020B0609020204030204" pitchFamily="49" charset="0"/>
-              </a:rPr>
-              <a:t>y_train</a:t>
-            </a:r>
-            <a:r>
-              <a:rPr lang="en-SG" b="0" dirty="0">
-                <a:solidFill>
-                  <a:srgbClr val="000000"/>
-                </a:solidFill>
-                <a:effectLst/>
-                <a:highlight>
-                  <a:srgbClr val="D6E0EB"/>
-                </a:highlight>
-                <a:latin typeface="Consolas" panose="020B0609020204030204" pitchFamily="49" charset="0"/>
-              </a:rPr>
-              <a:t>, </a:t>
-            </a:r>
-            <a:r>
-              <a:rPr lang="en-SG" b="0" dirty="0" err="1">
-                <a:solidFill>
-                  <a:srgbClr val="001080"/>
-                </a:solidFill>
-                <a:effectLst/>
-                <a:highlight>
-                  <a:srgbClr val="D6E0EB"/>
-                </a:highlight>
-                <a:latin typeface="Consolas" panose="020B0609020204030204" pitchFamily="49" charset="0"/>
-              </a:rPr>
-              <a:t>sampling_method</a:t>
-            </a:r>
-            <a:r>
-              <a:rPr lang="en-SG" b="0" dirty="0">
-                <a:solidFill>
-                  <a:srgbClr val="000000"/>
-                </a:solidFill>
-                <a:effectLst/>
-                <a:highlight>
-                  <a:srgbClr val="D6E0EB"/>
-                </a:highlight>
-                <a:latin typeface="Consolas" panose="020B0609020204030204" pitchFamily="49" charset="0"/>
-              </a:rPr>
-              <a:t>, </a:t>
-            </a:r>
-            <a:r>
-              <a:rPr lang="en-SG" b="0" dirty="0" err="1">
-                <a:solidFill>
-                  <a:srgbClr val="001080"/>
-                </a:solidFill>
-                <a:effectLst/>
-                <a:highlight>
-                  <a:srgbClr val="D6E0EB"/>
-                </a:highlight>
-                <a:latin typeface="Consolas" panose="020B0609020204030204" pitchFamily="49" charset="0"/>
-              </a:rPr>
-              <a:t>sampling_strategy</a:t>
-            </a:r>
-            <a:r>
-              <a:rPr lang="en-SG" b="0" dirty="0">
-                <a:solidFill>
-                  <a:srgbClr val="000000"/>
-                </a:solidFill>
-                <a:effectLst/>
-                <a:highlight>
-                  <a:srgbClr val="D6E0EB"/>
-                </a:highlight>
-                <a:latin typeface="Consolas" panose="020B0609020204030204" pitchFamily="49" charset="0"/>
-              </a:rPr>
-              <a:t>=</a:t>
-            </a:r>
-            <a:r>
-              <a:rPr lang="en-SG" b="0" dirty="0" err="1">
-                <a:solidFill>
-                  <a:srgbClr val="001080"/>
-                </a:solidFill>
-                <a:effectLst/>
-                <a:highlight>
-                  <a:srgbClr val="D6E0EB"/>
-                </a:highlight>
-                <a:latin typeface="Consolas" panose="020B0609020204030204" pitchFamily="49" charset="0"/>
-              </a:rPr>
-              <a:t>sampling_strategy</a:t>
-            </a:r>
-            <a:r>
-              <a:rPr lang="en-SG" b="0" dirty="0">
-                <a:solidFill>
-                  <a:srgbClr val="000000"/>
-                </a:solidFill>
-                <a:effectLst/>
-                <a:highlight>
-                  <a:srgbClr val="D6E0EB"/>
-                </a:highlight>
-                <a:latin typeface="Consolas" panose="020B0609020204030204" pitchFamily="49" charset="0"/>
-              </a:rPr>
-              <a:t>)</a:t>
-            </a:r>
-          </a:p>
-          <a:p>
-            <a:r>
-              <a:rPr lang="en-SG" b="0" dirty="0">
-                <a:solidFill>
-                  <a:srgbClr val="000000"/>
-                </a:solidFill>
-                <a:effectLst/>
-                <a:highlight>
-                  <a:srgbClr val="D6E0EB"/>
-                </a:highlight>
-                <a:latin typeface="Consolas" panose="020B0609020204030204" pitchFamily="49" charset="0"/>
-              </a:rPr>
-              <a:t>    </a:t>
-            </a:r>
-            <a:r>
-              <a:rPr lang="en-SG" b="0" dirty="0">
-                <a:solidFill>
-                  <a:srgbClr val="008000"/>
-                </a:solidFill>
-                <a:effectLst/>
-                <a:highlight>
-                  <a:srgbClr val="D6E0EB"/>
-                </a:highlight>
-                <a:latin typeface="Consolas" panose="020B0609020204030204" pitchFamily="49" charset="0"/>
-              </a:rPr>
-              <a:t># </a:t>
-            </a:r>
-            <a:r>
-              <a:rPr lang="en-SG" b="0" dirty="0" err="1">
-                <a:solidFill>
-                  <a:srgbClr val="008000"/>
-                </a:solidFill>
-                <a:effectLst/>
-                <a:highlight>
-                  <a:srgbClr val="D6E0EB"/>
-                </a:highlight>
-                <a:latin typeface="Consolas" panose="020B0609020204030204" pitchFamily="49" charset="0"/>
-              </a:rPr>
-              <a:t>X_test,y_test</a:t>
-            </a:r>
-            <a:r>
-              <a:rPr lang="en-SG" b="0" dirty="0">
-                <a:solidFill>
-                  <a:srgbClr val="008000"/>
-                </a:solidFill>
-                <a:effectLst/>
-                <a:highlight>
-                  <a:srgbClr val="D6E0EB"/>
-                </a:highlight>
-                <a:latin typeface="Consolas" panose="020B0609020204030204" pitchFamily="49" charset="0"/>
-              </a:rPr>
-              <a:t> = </a:t>
-            </a:r>
-            <a:r>
-              <a:rPr lang="en-SG" b="0" dirty="0" err="1">
-                <a:solidFill>
-                  <a:srgbClr val="008000"/>
-                </a:solidFill>
-                <a:effectLst/>
-                <a:highlight>
-                  <a:srgbClr val="D6E0EB"/>
-                </a:highlight>
-                <a:latin typeface="Consolas" panose="020B0609020204030204" pitchFamily="49" charset="0"/>
-              </a:rPr>
-              <a:t>sample_imbalanced_data</a:t>
-            </a:r>
-            <a:r>
-              <a:rPr lang="en-SG" b="0" dirty="0">
-                <a:solidFill>
-                  <a:srgbClr val="008000"/>
-                </a:solidFill>
-                <a:effectLst/>
-                <a:highlight>
-                  <a:srgbClr val="D6E0EB"/>
-                </a:highlight>
-                <a:latin typeface="Consolas" panose="020B0609020204030204" pitchFamily="49" charset="0"/>
-              </a:rPr>
-              <a:t>(</a:t>
-            </a:r>
-            <a:r>
-              <a:rPr lang="en-SG" b="0" dirty="0" err="1">
-                <a:solidFill>
-                  <a:srgbClr val="008000"/>
-                </a:solidFill>
-                <a:effectLst/>
-                <a:highlight>
-                  <a:srgbClr val="D6E0EB"/>
-                </a:highlight>
-                <a:latin typeface="Consolas" panose="020B0609020204030204" pitchFamily="49" charset="0"/>
-              </a:rPr>
-              <a:t>X_test,y_test</a:t>
-            </a:r>
-            <a:r>
-              <a:rPr lang="en-SG" b="0" dirty="0">
-                <a:solidFill>
-                  <a:srgbClr val="008000"/>
-                </a:solidFill>
-                <a:effectLst/>
-                <a:highlight>
-                  <a:srgbClr val="D6E0EB"/>
-                </a:highlight>
-                <a:latin typeface="Consolas" panose="020B0609020204030204" pitchFamily="49" charset="0"/>
-              </a:rPr>
-              <a:t>, 0, </a:t>
-            </a:r>
-            <a:r>
-              <a:rPr lang="en-SG" b="0" dirty="0" err="1">
-                <a:solidFill>
-                  <a:srgbClr val="008000"/>
-                </a:solidFill>
-                <a:effectLst/>
-                <a:highlight>
-                  <a:srgbClr val="D6E0EB"/>
-                </a:highlight>
-                <a:latin typeface="Consolas" panose="020B0609020204030204" pitchFamily="49" charset="0"/>
-              </a:rPr>
-              <a:t>sampling_strategy</a:t>
-            </a:r>
-            <a:r>
-              <a:rPr lang="en-SG" b="0" dirty="0">
-                <a:solidFill>
-                  <a:srgbClr val="008000"/>
-                </a:solidFill>
-                <a:effectLst/>
-                <a:highlight>
-                  <a:srgbClr val="D6E0EB"/>
-                </a:highlight>
-                <a:latin typeface="Consolas" panose="020B0609020204030204" pitchFamily="49" charset="0"/>
-              </a:rPr>
-              <a:t>=</a:t>
-            </a:r>
-            <a:r>
-              <a:rPr lang="en-SG" b="0" dirty="0" err="1">
-                <a:solidFill>
-                  <a:srgbClr val="008000"/>
-                </a:solidFill>
-                <a:effectLst/>
-                <a:highlight>
-                  <a:srgbClr val="D6E0EB"/>
-                </a:highlight>
-                <a:latin typeface="Consolas" panose="020B0609020204030204" pitchFamily="49" charset="0"/>
-              </a:rPr>
-              <a:t>sampling_strategy</a:t>
-            </a:r>
-            <a:r>
-              <a:rPr lang="en-SG" b="0" dirty="0">
-                <a:solidFill>
-                  <a:srgbClr val="008000"/>
-                </a:solidFill>
-                <a:effectLst/>
-                <a:highlight>
-                  <a:srgbClr val="D6E0EB"/>
-                </a:highlight>
-                <a:latin typeface="Consolas" panose="020B0609020204030204" pitchFamily="49" charset="0"/>
-              </a:rPr>
-              <a:t>)</a:t>
-            </a:r>
-            <a:endParaRPr lang="en-SG" b="0" dirty="0">
-              <a:solidFill>
-                <a:srgbClr val="000000"/>
-              </a:solidFill>
-              <a:effectLst/>
-              <a:highlight>
-                <a:srgbClr val="D6E0EB"/>
-              </a:highlight>
-              <a:latin typeface="Consolas" panose="020B0609020204030204" pitchFamily="49" charset="0"/>
-            </a:endParaRPr>
-          </a:p>
-          <a:p>
-            <a:r>
-              <a:rPr lang="en-SG" b="0" dirty="0">
-                <a:solidFill>
-                  <a:srgbClr val="000000"/>
-                </a:solidFill>
-                <a:effectLst/>
-                <a:highlight>
-                  <a:srgbClr val="D6E0EB"/>
-                </a:highlight>
-                <a:latin typeface="Consolas" panose="020B0609020204030204" pitchFamily="49" charset="0"/>
-              </a:rPr>
-              <a:t>    </a:t>
-            </a:r>
-            <a:r>
-              <a:rPr lang="en-SG" b="0" dirty="0" err="1">
-                <a:solidFill>
-                  <a:srgbClr val="001080"/>
-                </a:solidFill>
-                <a:effectLst/>
-                <a:highlight>
-                  <a:srgbClr val="D6E0EB"/>
-                </a:highlight>
-                <a:latin typeface="Consolas" panose="020B0609020204030204" pitchFamily="49" charset="0"/>
-              </a:rPr>
-              <a:t>min_samples_leaf</a:t>
-            </a:r>
-            <a:r>
-              <a:rPr lang="en-SG" b="0" dirty="0">
-                <a:solidFill>
-                  <a:srgbClr val="000000"/>
-                </a:solidFill>
-                <a:effectLst/>
-                <a:highlight>
-                  <a:srgbClr val="D6E0EB"/>
-                </a:highlight>
-                <a:latin typeface="Consolas" panose="020B0609020204030204" pitchFamily="49" charset="0"/>
-              </a:rPr>
-              <a:t>=</a:t>
-            </a:r>
-            <a:r>
-              <a:rPr lang="en-SG" b="0" dirty="0">
-                <a:solidFill>
-                  <a:srgbClr val="098658"/>
-                </a:solidFill>
-                <a:effectLst/>
-                <a:highlight>
-                  <a:srgbClr val="D6E0EB"/>
-                </a:highlight>
-                <a:latin typeface="Consolas" panose="020B0609020204030204" pitchFamily="49" charset="0"/>
-              </a:rPr>
-              <a:t>10</a:t>
-            </a:r>
-            <a:endParaRPr lang="en-SG" b="0" dirty="0">
-              <a:solidFill>
-                <a:srgbClr val="000000"/>
-              </a:solidFill>
-              <a:effectLst/>
-              <a:highlight>
-                <a:srgbClr val="D6E0EB"/>
-              </a:highlight>
-              <a:latin typeface="Consolas" panose="020B0609020204030204" pitchFamily="49" charset="0"/>
-            </a:endParaRPr>
-          </a:p>
-          <a:p>
-            <a:r>
-              <a:rPr lang="en-SG" b="0" dirty="0">
-                <a:solidFill>
-                  <a:srgbClr val="000000"/>
-                </a:solidFill>
-                <a:effectLst/>
-                <a:highlight>
-                  <a:srgbClr val="D6E0EB"/>
-                </a:highlight>
-                <a:latin typeface="Consolas" panose="020B0609020204030204" pitchFamily="49" charset="0"/>
-              </a:rPr>
-              <a:t>    </a:t>
-            </a:r>
-            <a:r>
-              <a:rPr lang="en-SG" b="0" dirty="0" err="1">
-                <a:solidFill>
-                  <a:srgbClr val="001080"/>
-                </a:solidFill>
-                <a:effectLst/>
-                <a:highlight>
-                  <a:srgbClr val="D6E0EB"/>
-                </a:highlight>
-                <a:latin typeface="Consolas" panose="020B0609020204030204" pitchFamily="49" charset="0"/>
-              </a:rPr>
-              <a:t>max_depth</a:t>
-            </a:r>
-            <a:r>
-              <a:rPr lang="en-SG" b="0" dirty="0">
-                <a:solidFill>
-                  <a:srgbClr val="000000"/>
-                </a:solidFill>
-                <a:effectLst/>
-                <a:highlight>
-                  <a:srgbClr val="D6E0EB"/>
-                </a:highlight>
-                <a:latin typeface="Consolas" panose="020B0609020204030204" pitchFamily="49" charset="0"/>
-              </a:rPr>
-              <a:t>=</a:t>
-            </a:r>
-            <a:r>
-              <a:rPr lang="en-SG" dirty="0">
-                <a:solidFill>
-                  <a:srgbClr val="098658"/>
-                </a:solidFill>
-                <a:highlight>
-                  <a:srgbClr val="D6E0EB"/>
-                </a:highlight>
-                <a:latin typeface="Consolas" panose="020B0609020204030204" pitchFamily="49" charset="0"/>
-              </a:rPr>
-              <a:t>7</a:t>
-            </a:r>
-            <a:endParaRPr lang="en-SG" b="0" dirty="0">
-              <a:solidFill>
-                <a:srgbClr val="000000"/>
-              </a:solidFill>
-              <a:effectLst/>
-              <a:highlight>
-                <a:srgbClr val="D6E0EB"/>
-              </a:highlight>
-              <a:latin typeface="Consolas" panose="020B0609020204030204" pitchFamily="49" charset="0"/>
-            </a:endParaRPr>
-          </a:p>
-          <a:p>
-            <a:r>
-              <a:rPr lang="en-SG" b="0" dirty="0">
-                <a:solidFill>
-                  <a:srgbClr val="000000"/>
-                </a:solidFill>
-                <a:effectLst/>
-                <a:highlight>
-                  <a:srgbClr val="D6E0EB"/>
-                </a:highlight>
-                <a:latin typeface="Consolas" panose="020B0609020204030204" pitchFamily="49" charset="0"/>
-              </a:rPr>
-              <a:t>    </a:t>
-            </a:r>
-            <a:r>
-              <a:rPr lang="en-SG" b="0" dirty="0">
-                <a:solidFill>
-                  <a:srgbClr val="001080"/>
-                </a:solidFill>
-                <a:effectLst/>
-                <a:highlight>
-                  <a:srgbClr val="D6E0EB"/>
-                </a:highlight>
-                <a:latin typeface="Consolas" panose="020B0609020204030204" pitchFamily="49" charset="0"/>
-              </a:rPr>
-              <a:t>estimators</a:t>
-            </a:r>
-            <a:r>
-              <a:rPr lang="en-SG" b="0" dirty="0">
-                <a:solidFill>
-                  <a:srgbClr val="000000"/>
-                </a:solidFill>
-                <a:effectLst/>
-                <a:highlight>
-                  <a:srgbClr val="D6E0EB"/>
-                </a:highlight>
-                <a:latin typeface="Consolas" panose="020B0609020204030204" pitchFamily="49" charset="0"/>
-              </a:rPr>
-              <a:t>=</a:t>
-            </a:r>
-            <a:r>
-              <a:rPr lang="en-SG" b="0" dirty="0">
-                <a:solidFill>
-                  <a:srgbClr val="098658"/>
-                </a:solidFill>
-                <a:effectLst/>
-                <a:highlight>
-                  <a:srgbClr val="D6E0EB"/>
-                </a:highlight>
-                <a:latin typeface="Consolas" panose="020B0609020204030204" pitchFamily="49" charset="0"/>
-              </a:rPr>
-              <a:t>50</a:t>
-            </a:r>
-            <a:endParaRPr lang="en-SG" b="0" dirty="0">
-              <a:solidFill>
-                <a:srgbClr val="000000"/>
-              </a:solidFill>
-              <a:effectLst/>
-              <a:highlight>
-                <a:srgbClr val="D6E0EB"/>
-              </a:highlight>
-              <a:latin typeface="Consolas" panose="020B0609020204030204" pitchFamily="49" charset="0"/>
-            </a:endParaRPr>
-          </a:p>
-          <a:p>
-            <a:r>
-              <a:rPr lang="en-SG" b="0" dirty="0">
-                <a:solidFill>
-                  <a:srgbClr val="000000"/>
-                </a:solidFill>
-                <a:effectLst/>
-                <a:highlight>
-                  <a:srgbClr val="D6E0EB"/>
-                </a:highlight>
-                <a:latin typeface="Consolas" panose="020B0609020204030204" pitchFamily="49" charset="0"/>
-              </a:rPr>
-              <a:t>    </a:t>
-            </a:r>
-            <a:r>
-              <a:rPr lang="en-SG" b="0" dirty="0" err="1">
-                <a:solidFill>
-                  <a:srgbClr val="001080"/>
-                </a:solidFill>
-                <a:effectLst/>
-                <a:highlight>
-                  <a:srgbClr val="D6E0EB"/>
-                </a:highlight>
-                <a:latin typeface="Consolas" panose="020B0609020204030204" pitchFamily="49" charset="0"/>
-              </a:rPr>
-              <a:t>samples_leaf_sizes</a:t>
-            </a:r>
-            <a:r>
-              <a:rPr lang="en-SG" b="0" dirty="0">
-                <a:solidFill>
-                  <a:srgbClr val="000000"/>
-                </a:solidFill>
-                <a:effectLst/>
-                <a:highlight>
-                  <a:srgbClr val="D6E0EB"/>
-                </a:highlight>
-                <a:latin typeface="Consolas" panose="020B0609020204030204" pitchFamily="49" charset="0"/>
-              </a:rPr>
-              <a:t> = [</a:t>
-            </a:r>
-            <a:r>
-              <a:rPr lang="en-SG" b="0" dirty="0">
-                <a:solidFill>
-                  <a:srgbClr val="098658"/>
-                </a:solidFill>
-                <a:effectLst/>
-                <a:highlight>
-                  <a:srgbClr val="D6E0EB"/>
-                </a:highlight>
-                <a:latin typeface="Consolas" panose="020B0609020204030204" pitchFamily="49" charset="0"/>
-              </a:rPr>
-              <a:t>2</a:t>
-            </a:r>
-            <a:r>
-              <a:rPr lang="en-SG" b="0" dirty="0">
-                <a:solidFill>
-                  <a:srgbClr val="000000"/>
-                </a:solidFill>
-                <a:effectLst/>
-                <a:highlight>
-                  <a:srgbClr val="D6E0EB"/>
-                </a:highlight>
-                <a:latin typeface="Consolas" panose="020B0609020204030204" pitchFamily="49" charset="0"/>
-              </a:rPr>
-              <a:t>,</a:t>
-            </a:r>
-            <a:r>
-              <a:rPr lang="en-SG" b="0" dirty="0">
-                <a:solidFill>
-                  <a:srgbClr val="098658"/>
-                </a:solidFill>
-                <a:effectLst/>
-                <a:highlight>
-                  <a:srgbClr val="D6E0EB"/>
-                </a:highlight>
-                <a:latin typeface="Consolas" panose="020B0609020204030204" pitchFamily="49" charset="0"/>
-              </a:rPr>
-              <a:t>4</a:t>
-            </a:r>
-            <a:r>
-              <a:rPr lang="en-SG" b="0" dirty="0">
-                <a:solidFill>
-                  <a:srgbClr val="000000"/>
-                </a:solidFill>
-                <a:effectLst/>
-                <a:highlight>
-                  <a:srgbClr val="D6E0EB"/>
-                </a:highlight>
-                <a:latin typeface="Consolas" panose="020B0609020204030204" pitchFamily="49" charset="0"/>
-              </a:rPr>
-              <a:t>,</a:t>
-            </a:r>
-            <a:r>
-              <a:rPr lang="en-SG" b="0" dirty="0">
-                <a:solidFill>
-                  <a:srgbClr val="098658"/>
-                </a:solidFill>
-                <a:effectLst/>
-                <a:highlight>
-                  <a:srgbClr val="D6E0EB"/>
-                </a:highlight>
-                <a:latin typeface="Consolas" panose="020B0609020204030204" pitchFamily="49" charset="0"/>
-              </a:rPr>
-              <a:t>6</a:t>
-            </a:r>
-            <a:r>
-              <a:rPr lang="en-SG" b="0" dirty="0">
-                <a:solidFill>
-                  <a:srgbClr val="000000"/>
-                </a:solidFill>
-                <a:effectLst/>
-                <a:highlight>
-                  <a:srgbClr val="D6E0EB"/>
-                </a:highlight>
-                <a:latin typeface="Consolas" panose="020B0609020204030204" pitchFamily="49" charset="0"/>
-              </a:rPr>
-              <a:t>,</a:t>
-            </a:r>
-            <a:r>
-              <a:rPr lang="en-SG" b="0" dirty="0">
-                <a:solidFill>
-                  <a:srgbClr val="098658"/>
-                </a:solidFill>
-                <a:effectLst/>
-                <a:highlight>
-                  <a:srgbClr val="D6E0EB"/>
-                </a:highlight>
-                <a:latin typeface="Consolas" panose="020B0609020204030204" pitchFamily="49" charset="0"/>
-              </a:rPr>
-              <a:t>7</a:t>
-            </a:r>
-            <a:r>
-              <a:rPr lang="en-SG" b="0" dirty="0">
-                <a:solidFill>
-                  <a:srgbClr val="000000"/>
-                </a:solidFill>
-                <a:effectLst/>
-                <a:highlight>
-                  <a:srgbClr val="D6E0EB"/>
-                </a:highlight>
-                <a:latin typeface="Consolas" panose="020B0609020204030204" pitchFamily="49" charset="0"/>
-              </a:rPr>
-              <a:t>,</a:t>
-            </a:r>
-            <a:r>
-              <a:rPr lang="en-SG" b="0" dirty="0">
-                <a:solidFill>
-                  <a:srgbClr val="098658"/>
-                </a:solidFill>
-                <a:effectLst/>
-                <a:highlight>
-                  <a:srgbClr val="D6E0EB"/>
-                </a:highlight>
-                <a:latin typeface="Consolas" panose="020B0609020204030204" pitchFamily="49" charset="0"/>
-              </a:rPr>
-              <a:t>8</a:t>
-            </a:r>
-            <a:r>
-              <a:rPr lang="en-SG" b="0" dirty="0">
-                <a:solidFill>
-                  <a:srgbClr val="000000"/>
-                </a:solidFill>
-                <a:effectLst/>
-                <a:highlight>
-                  <a:srgbClr val="D6E0EB"/>
-                </a:highlight>
-                <a:latin typeface="Consolas" panose="020B0609020204030204" pitchFamily="49" charset="0"/>
-              </a:rPr>
-              <a:t>,</a:t>
-            </a:r>
-            <a:r>
-              <a:rPr lang="en-SG" b="0" dirty="0">
-                <a:solidFill>
-                  <a:srgbClr val="098658"/>
-                </a:solidFill>
-                <a:effectLst/>
-                <a:highlight>
-                  <a:srgbClr val="D6E0EB"/>
-                </a:highlight>
-                <a:latin typeface="Consolas" panose="020B0609020204030204" pitchFamily="49" charset="0"/>
-              </a:rPr>
-              <a:t>10</a:t>
-            </a:r>
-            <a:r>
-              <a:rPr lang="en-SG" b="0" dirty="0">
-                <a:solidFill>
-                  <a:srgbClr val="000000"/>
-                </a:solidFill>
-                <a:effectLst/>
-                <a:highlight>
-                  <a:srgbClr val="D6E0EB"/>
-                </a:highlight>
-                <a:latin typeface="Consolas" panose="020B0609020204030204" pitchFamily="49" charset="0"/>
-              </a:rPr>
-              <a:t>,</a:t>
-            </a:r>
-            <a:r>
-              <a:rPr lang="en-SG" b="0" dirty="0">
-                <a:solidFill>
-                  <a:srgbClr val="098658"/>
-                </a:solidFill>
-                <a:effectLst/>
-                <a:highlight>
-                  <a:srgbClr val="D6E0EB"/>
-                </a:highlight>
-                <a:latin typeface="Consolas" panose="020B0609020204030204" pitchFamily="49" charset="0"/>
-              </a:rPr>
-              <a:t>20</a:t>
-            </a:r>
-            <a:r>
-              <a:rPr lang="en-SG" b="0" dirty="0">
-                <a:solidFill>
-                  <a:srgbClr val="000000"/>
-                </a:solidFill>
-                <a:effectLst/>
-                <a:highlight>
-                  <a:srgbClr val="D6E0EB"/>
-                </a:highlight>
-                <a:latin typeface="Consolas" panose="020B0609020204030204" pitchFamily="49" charset="0"/>
-              </a:rPr>
-              <a:t>,</a:t>
-            </a:r>
-            <a:r>
-              <a:rPr lang="en-SG" b="0" dirty="0">
-                <a:solidFill>
-                  <a:srgbClr val="098658"/>
-                </a:solidFill>
-                <a:effectLst/>
-                <a:highlight>
-                  <a:srgbClr val="D6E0EB"/>
-                </a:highlight>
-                <a:latin typeface="Consolas" panose="020B0609020204030204" pitchFamily="49" charset="0"/>
-              </a:rPr>
-              <a:t>30</a:t>
-            </a:r>
-            <a:r>
-              <a:rPr lang="en-SG" b="0" dirty="0">
-                <a:solidFill>
-                  <a:srgbClr val="000000"/>
-                </a:solidFill>
-                <a:effectLst/>
-                <a:highlight>
-                  <a:srgbClr val="D6E0EB"/>
-                </a:highlight>
-                <a:latin typeface="Consolas" panose="020B0609020204030204" pitchFamily="49" charset="0"/>
-              </a:rPr>
-              <a:t>,</a:t>
-            </a:r>
-            <a:r>
-              <a:rPr lang="en-SG" b="0" dirty="0">
-                <a:solidFill>
-                  <a:srgbClr val="098658"/>
-                </a:solidFill>
-                <a:effectLst/>
-                <a:highlight>
-                  <a:srgbClr val="D6E0EB"/>
-                </a:highlight>
-                <a:latin typeface="Consolas" panose="020B0609020204030204" pitchFamily="49" charset="0"/>
-              </a:rPr>
-              <a:t>40</a:t>
-            </a:r>
-            <a:r>
-              <a:rPr lang="en-SG" b="0" dirty="0">
-                <a:solidFill>
-                  <a:srgbClr val="000000"/>
-                </a:solidFill>
-                <a:effectLst/>
-                <a:highlight>
-                  <a:srgbClr val="D6E0EB"/>
-                </a:highlight>
-                <a:latin typeface="Consolas" panose="020B0609020204030204" pitchFamily="49" charset="0"/>
-              </a:rPr>
-              <a:t>,</a:t>
-            </a:r>
-            <a:r>
-              <a:rPr lang="en-SG" b="0" dirty="0">
-                <a:solidFill>
-                  <a:srgbClr val="098658"/>
-                </a:solidFill>
-                <a:effectLst/>
-                <a:highlight>
-                  <a:srgbClr val="D6E0EB"/>
-                </a:highlight>
-                <a:latin typeface="Consolas" panose="020B0609020204030204" pitchFamily="49" charset="0"/>
-              </a:rPr>
-              <a:t>50</a:t>
-            </a:r>
-            <a:r>
-              <a:rPr lang="en-SG" b="0" dirty="0">
-                <a:solidFill>
-                  <a:srgbClr val="000000"/>
-                </a:solidFill>
-                <a:effectLst/>
-                <a:highlight>
-                  <a:srgbClr val="D6E0EB"/>
-                </a:highlight>
-                <a:latin typeface="Consolas" panose="020B0609020204030204" pitchFamily="49" charset="0"/>
-              </a:rPr>
-              <a:t>]</a:t>
-            </a:r>
-          </a:p>
-          <a:p>
-            <a:r>
-              <a:rPr lang="en-SG" b="0" dirty="0">
-                <a:solidFill>
-                  <a:srgbClr val="000000"/>
-                </a:solidFill>
-                <a:effectLst/>
-                <a:highlight>
-                  <a:srgbClr val="D6E0EB"/>
-                </a:highlight>
-                <a:latin typeface="Consolas" panose="020B0609020204030204" pitchFamily="49" charset="0"/>
-              </a:rPr>
-              <a:t>    </a:t>
-            </a:r>
-            <a:r>
-              <a:rPr lang="en-SG" b="0" dirty="0" err="1">
-                <a:solidFill>
-                  <a:srgbClr val="001080"/>
-                </a:solidFill>
-                <a:effectLst/>
-                <a:highlight>
-                  <a:srgbClr val="D6E0EB"/>
-                </a:highlight>
-                <a:latin typeface="Consolas" panose="020B0609020204030204" pitchFamily="49" charset="0"/>
-              </a:rPr>
-              <a:t>tree_depths</a:t>
-            </a:r>
-            <a:r>
-              <a:rPr lang="en-SG" b="0" dirty="0">
-                <a:solidFill>
-                  <a:srgbClr val="000000"/>
-                </a:solidFill>
-                <a:effectLst/>
-                <a:highlight>
-                  <a:srgbClr val="D6E0EB"/>
-                </a:highlight>
-                <a:latin typeface="Consolas" panose="020B0609020204030204" pitchFamily="49" charset="0"/>
-              </a:rPr>
-              <a:t> = </a:t>
-            </a:r>
-            <a:r>
-              <a:rPr lang="en-SG" b="0" dirty="0">
-                <a:solidFill>
-                  <a:srgbClr val="267F99"/>
-                </a:solidFill>
-                <a:effectLst/>
-                <a:highlight>
-                  <a:srgbClr val="D6E0EB"/>
-                </a:highlight>
-                <a:latin typeface="Consolas" panose="020B0609020204030204" pitchFamily="49" charset="0"/>
-              </a:rPr>
-              <a:t>range</a:t>
-            </a:r>
-            <a:r>
-              <a:rPr lang="en-SG" b="0" dirty="0">
-                <a:solidFill>
-                  <a:srgbClr val="000000"/>
-                </a:solidFill>
-                <a:effectLst/>
-                <a:highlight>
-                  <a:srgbClr val="D6E0EB"/>
-                </a:highlight>
-                <a:latin typeface="Consolas" panose="020B0609020204030204" pitchFamily="49" charset="0"/>
-              </a:rPr>
-              <a:t>(</a:t>
-            </a:r>
-            <a:r>
-              <a:rPr lang="en-SG" b="0" dirty="0">
-                <a:solidFill>
-                  <a:srgbClr val="098658"/>
-                </a:solidFill>
-                <a:effectLst/>
-                <a:highlight>
-                  <a:srgbClr val="D6E0EB"/>
-                </a:highlight>
-                <a:latin typeface="Consolas" panose="020B0609020204030204" pitchFamily="49" charset="0"/>
-              </a:rPr>
-              <a:t>1</a:t>
-            </a:r>
-            <a:r>
-              <a:rPr lang="en-SG" b="0" dirty="0">
-                <a:solidFill>
-                  <a:srgbClr val="000000"/>
-                </a:solidFill>
-                <a:effectLst/>
-                <a:highlight>
-                  <a:srgbClr val="D6E0EB"/>
-                </a:highlight>
-                <a:latin typeface="Consolas" panose="020B0609020204030204" pitchFamily="49" charset="0"/>
-              </a:rPr>
-              <a:t>,</a:t>
-            </a:r>
-            <a:r>
-              <a:rPr lang="en-SG" b="0" dirty="0">
-                <a:solidFill>
-                  <a:srgbClr val="098658"/>
-                </a:solidFill>
-                <a:effectLst/>
-                <a:highlight>
-                  <a:srgbClr val="D6E0EB"/>
-                </a:highlight>
-                <a:latin typeface="Consolas" panose="020B0609020204030204" pitchFamily="49" charset="0"/>
-              </a:rPr>
-              <a:t>25</a:t>
-            </a:r>
-            <a:r>
-              <a:rPr lang="en-SG" b="0" dirty="0">
-                <a:solidFill>
-                  <a:srgbClr val="000000"/>
-                </a:solidFill>
-                <a:effectLst/>
-                <a:highlight>
-                  <a:srgbClr val="D6E0EB"/>
-                </a:highlight>
-                <a:latin typeface="Consolas" panose="020B0609020204030204" pitchFamily="49" charset="0"/>
-              </a:rPr>
-              <a:t>)</a:t>
-            </a:r>
-          </a:p>
-          <a:p>
-            <a:r>
-              <a:rPr lang="en-SG" b="0" dirty="0">
-                <a:solidFill>
-                  <a:srgbClr val="000000"/>
-                </a:solidFill>
-                <a:effectLst/>
-                <a:highlight>
-                  <a:srgbClr val="D6E0EB"/>
-                </a:highlight>
-                <a:latin typeface="Consolas" panose="020B0609020204030204" pitchFamily="49" charset="0"/>
-              </a:rPr>
-              <a:t>    </a:t>
-            </a:r>
-            <a:r>
-              <a:rPr lang="en-SG" b="0" dirty="0" err="1">
-                <a:solidFill>
-                  <a:srgbClr val="001080"/>
-                </a:solidFill>
-                <a:effectLst/>
-                <a:highlight>
-                  <a:srgbClr val="D6E0EB"/>
-                </a:highlight>
-                <a:latin typeface="Consolas" panose="020B0609020204030204" pitchFamily="49" charset="0"/>
-              </a:rPr>
-              <a:t>class_weight</a:t>
-            </a:r>
-            <a:r>
-              <a:rPr lang="en-SG" b="0" dirty="0">
-                <a:solidFill>
-                  <a:srgbClr val="000000"/>
-                </a:solidFill>
-                <a:effectLst/>
-                <a:highlight>
-                  <a:srgbClr val="D6E0EB"/>
-                </a:highlight>
-                <a:latin typeface="Consolas" panose="020B0609020204030204" pitchFamily="49" charset="0"/>
-              </a:rPr>
-              <a:t>=</a:t>
-            </a:r>
-            <a:r>
-              <a:rPr lang="en-SG" b="0" dirty="0">
-                <a:solidFill>
-                  <a:srgbClr val="A31515"/>
-                </a:solidFill>
-                <a:effectLst/>
-                <a:highlight>
-                  <a:srgbClr val="D6E0EB"/>
-                </a:highlight>
-                <a:latin typeface="Consolas" panose="020B0609020204030204" pitchFamily="49" charset="0"/>
-              </a:rPr>
-              <a:t>'balanced'</a:t>
-            </a:r>
-            <a:endParaRPr lang="en-SG" b="0" dirty="0">
-              <a:solidFill>
-                <a:srgbClr val="000000"/>
-              </a:solidFill>
-              <a:effectLst/>
-              <a:highlight>
-                <a:srgbClr val="D6E0EB"/>
-              </a:highlight>
-              <a:latin typeface="Consolas" panose="020B0609020204030204" pitchFamily="49" charset="0"/>
-            </a:endParaRPr>
-          </a:p>
-          <a:p>
-            <a:r>
-              <a:rPr lang="en-SG" b="0" dirty="0">
-                <a:solidFill>
-                  <a:srgbClr val="000000"/>
-                </a:solidFill>
-                <a:effectLst/>
-                <a:highlight>
-                  <a:srgbClr val="D6E0EB"/>
-                </a:highlight>
-                <a:latin typeface="Consolas" panose="020B0609020204030204" pitchFamily="49" charset="0"/>
-              </a:rPr>
-              <a:t>    </a:t>
-            </a:r>
-            <a:r>
-              <a:rPr lang="en-SG" b="0" dirty="0" err="1">
-                <a:solidFill>
-                  <a:srgbClr val="001080"/>
-                </a:solidFill>
-                <a:effectLst/>
-                <a:highlight>
-                  <a:srgbClr val="D6E0EB"/>
-                </a:highlight>
-                <a:latin typeface="Consolas" panose="020B0609020204030204" pitchFamily="49" charset="0"/>
-              </a:rPr>
-              <a:t>execute_crossval</a:t>
-            </a:r>
-            <a:r>
-              <a:rPr lang="en-SG" b="0" dirty="0">
-                <a:solidFill>
-                  <a:srgbClr val="000000"/>
-                </a:solidFill>
-                <a:effectLst/>
-                <a:highlight>
-                  <a:srgbClr val="D6E0EB"/>
-                </a:highlight>
-                <a:latin typeface="Consolas" panose="020B0609020204030204" pitchFamily="49" charset="0"/>
-              </a:rPr>
-              <a:t>=</a:t>
-            </a:r>
-            <a:r>
-              <a:rPr lang="en-SG" b="0" dirty="0">
-                <a:solidFill>
-                  <a:srgbClr val="0000FF"/>
-                </a:solidFill>
-                <a:effectLst/>
-                <a:highlight>
-                  <a:srgbClr val="D6E0EB"/>
-                </a:highlight>
-                <a:latin typeface="Consolas" panose="020B0609020204030204" pitchFamily="49" charset="0"/>
-              </a:rPr>
-              <a:t>True</a:t>
-            </a:r>
-            <a:endParaRPr lang="en-SG" b="0" dirty="0">
-              <a:solidFill>
-                <a:srgbClr val="000000"/>
-              </a:solidFill>
-              <a:effectLst/>
-              <a:highlight>
-                <a:srgbClr val="D6E0EB"/>
-              </a:highlight>
-              <a:latin typeface="Consolas" panose="020B0609020204030204" pitchFamily="49" charset="0"/>
-            </a:endParaRPr>
-          </a:p>
-          <a:p>
-            <a:endParaRPr lang="en-SG" dirty="0">
-              <a:highlight>
-                <a:srgbClr val="D6E0EB"/>
-              </a:highlight>
-            </a:endParaRPr>
-          </a:p>
-        </p:txBody>
-      </p:sp>
-      <p:sp>
-        <p:nvSpPr>
-          <p:cNvPr id="4" name="Title 3">
-            <a:extLst>
-              <a:ext uri="{FF2B5EF4-FFF2-40B4-BE49-F238E27FC236}">
-                <a16:creationId xmlns:a16="http://schemas.microsoft.com/office/drawing/2014/main" id="{71E87949-5C43-3ED6-5168-4CEE07D04D78}"/>
-              </a:ext>
-            </a:extLst>
-          </p:cNvPr>
-          <p:cNvSpPr>
-            <a:spLocks noGrp="1"/>
-          </p:cNvSpPr>
-          <p:nvPr>
-            <p:ph type="title"/>
-          </p:nvPr>
-        </p:nvSpPr>
-        <p:spPr>
-          <a:xfrm>
-            <a:off x="368137" y="379439"/>
-            <a:ext cx="9823998" cy="1325563"/>
-          </a:xfrm>
-        </p:spPr>
-        <p:txBody>
-          <a:bodyPr/>
-          <a:lstStyle/>
-          <a:p>
-            <a:r>
-              <a:rPr lang="en-US" dirty="0"/>
-              <a:t>UNDERSAMPLE AFTER SPLIT</a:t>
-            </a:r>
-            <a:endParaRPr lang="en-SG" dirty="0"/>
-          </a:p>
-        </p:txBody>
-      </p:sp>
-      <p:sp>
-        <p:nvSpPr>
-          <p:cNvPr id="5" name="Footer Placeholder 4">
-            <a:extLst>
-              <a:ext uri="{FF2B5EF4-FFF2-40B4-BE49-F238E27FC236}">
-                <a16:creationId xmlns:a16="http://schemas.microsoft.com/office/drawing/2014/main" id="{5E6C7A0E-F720-87D7-F168-209155662DE4}"/>
-              </a:ext>
-            </a:extLst>
-          </p:cNvPr>
-          <p:cNvSpPr>
-            <a:spLocks noGrp="1"/>
-          </p:cNvSpPr>
-          <p:nvPr>
-            <p:ph type="ftr" sz="quarter" idx="49"/>
-          </p:nvPr>
-        </p:nvSpPr>
-        <p:spPr/>
-        <p:txBody>
-          <a:bodyPr/>
-          <a:lstStyle/>
-          <a:p>
-            <a:r>
-              <a:rPr lang="en-US" noProof="0"/>
-              <a:t>Presentation Title</a:t>
-            </a:r>
-            <a:endParaRPr lang="en-US" noProof="0" dirty="0"/>
-          </a:p>
-        </p:txBody>
-      </p:sp>
-    </p:spTree>
-    <p:extLst>
-      <p:ext uri="{BB962C8B-B14F-4D97-AF65-F5344CB8AC3E}">
-        <p14:creationId xmlns:p14="http://schemas.microsoft.com/office/powerpoint/2010/main" val="2860544608"/>
-      </p:ext>
-    </p:extLst>
-  </p:cSld>
-  <p:clrMapOvr>
-    <a:masterClrMapping/>
-  </p:clrMapOvr>
-</p:sld>
-</file>
-
-<file path=ppt/slides/slide20.xml><?xml version="1.0" encoding="utf-8"?>
+<file path=ppt/slides/slide21.xml><?xml version="1.0" encoding="utf-8"?>
 <p:sld xmlns:a="http://schemas.openxmlformats.org/drawingml/2006/main" xmlns:r="http://schemas.openxmlformats.org/officeDocument/2006/relationships" xmlns:p="http://schemas.openxmlformats.org/presentationml/2006/main">
   <p:cSld>
     <p:spTree>
@@ -27104,7 +26167,7 @@
           <p:cNvPr id="2" name="Picture Placeholder 1">
             <a:extLst>
               <a:ext uri="{FF2B5EF4-FFF2-40B4-BE49-F238E27FC236}">
-                <a16:creationId xmlns:a16="http://schemas.microsoft.com/office/drawing/2014/main" id="{6AFBA7FF-C6E3-B993-CBB3-4906626B84A6}"/>
+                <a16:creationId xmlns:a16="http://schemas.microsoft.com/office/drawing/2014/main" id="{6023CE9B-E202-1A33-EB96-5D8D78F49B4D}"/>
               </a:ext>
             </a:extLst>
           </p:cNvPr>
@@ -27129,7 +26192,7 @@
           <p:cNvPr id="3" name="Text Placeholder 2">
             <a:extLst>
               <a:ext uri="{FF2B5EF4-FFF2-40B4-BE49-F238E27FC236}">
-                <a16:creationId xmlns:a16="http://schemas.microsoft.com/office/drawing/2014/main" id="{971BAE60-F63D-2EC3-2091-90F56FB2FACB}"/>
+                <a16:creationId xmlns:a16="http://schemas.microsoft.com/office/drawing/2014/main" id="{8001575A-D071-E5C9-BE33-D45296FF2546}"/>
               </a:ext>
             </a:extLst>
           </p:cNvPr>
@@ -27140,12 +26203,1317 @@
             <p:ph type="body" sz="quarter" idx="28"/>
           </p:nvPr>
         </p:nvSpPr>
-        <p:spPr/>
+        <p:spPr>
+          <a:xfrm>
+            <a:off x="368136" y="1312352"/>
+            <a:ext cx="11612369" cy="4808529"/>
+          </a:xfrm>
+        </p:spPr>
         <p:txBody>
           <a:bodyPr/>
           <a:lstStyle/>
           <a:p>
-            <a:endParaRPr lang="en-SG"/>
+            <a:r>
+              <a:rPr lang="en-SG" b="0" dirty="0">
+                <a:solidFill>
+                  <a:srgbClr val="000000"/>
+                </a:solidFill>
+                <a:effectLst/>
+                <a:highlight>
+                  <a:srgbClr val="D6E0EB"/>
+                </a:highlight>
+                <a:latin typeface="Consolas" panose="020B0609020204030204" pitchFamily="49" charset="0"/>
+              </a:rPr>
+              <a:t>    </a:t>
+            </a:r>
+            <a:r>
+              <a:rPr lang="en-SG" b="0" dirty="0">
+                <a:solidFill>
+                  <a:srgbClr val="008000"/>
+                </a:solidFill>
+                <a:effectLst/>
+                <a:highlight>
+                  <a:srgbClr val="D6E0EB"/>
+                </a:highlight>
+                <a:latin typeface="Consolas" panose="020B0609020204030204" pitchFamily="49" charset="0"/>
+              </a:rPr>
+              <a:t># # UNDERSAMPLE - Most efficient with still high accuracy</a:t>
+            </a:r>
+            <a:endParaRPr lang="en-SG" b="0" dirty="0">
+              <a:solidFill>
+                <a:srgbClr val="000000"/>
+              </a:solidFill>
+              <a:effectLst/>
+              <a:highlight>
+                <a:srgbClr val="D6E0EB"/>
+              </a:highlight>
+              <a:latin typeface="Consolas" panose="020B0609020204030204" pitchFamily="49" charset="0"/>
+            </a:endParaRPr>
+          </a:p>
+          <a:p>
+            <a:r>
+              <a:rPr lang="en-SG" b="0" dirty="0">
+                <a:solidFill>
+                  <a:srgbClr val="000000"/>
+                </a:solidFill>
+                <a:effectLst/>
+                <a:highlight>
+                  <a:srgbClr val="D6E0EB"/>
+                </a:highlight>
+                <a:latin typeface="Consolas" panose="020B0609020204030204" pitchFamily="49" charset="0"/>
+              </a:rPr>
+              <a:t>    </a:t>
+            </a:r>
+            <a:r>
+              <a:rPr lang="en-SG" b="0" dirty="0" err="1">
+                <a:solidFill>
+                  <a:srgbClr val="001080"/>
+                </a:solidFill>
+                <a:effectLst/>
+                <a:highlight>
+                  <a:srgbClr val="D6E0EB"/>
+                </a:highlight>
+                <a:latin typeface="Consolas" panose="020B0609020204030204" pitchFamily="49" charset="0"/>
+              </a:rPr>
+              <a:t>sampling_method</a:t>
+            </a:r>
+            <a:r>
+              <a:rPr lang="en-SG" b="0" dirty="0">
+                <a:solidFill>
+                  <a:srgbClr val="000000"/>
+                </a:solidFill>
+                <a:effectLst/>
+                <a:highlight>
+                  <a:srgbClr val="D6E0EB"/>
+                </a:highlight>
+                <a:latin typeface="Consolas" panose="020B0609020204030204" pitchFamily="49" charset="0"/>
+              </a:rPr>
+              <a:t>=</a:t>
+            </a:r>
+            <a:r>
+              <a:rPr lang="en-SG" b="0" dirty="0">
+                <a:solidFill>
+                  <a:srgbClr val="098658"/>
+                </a:solidFill>
+                <a:effectLst/>
+                <a:highlight>
+                  <a:srgbClr val="D6E0EB"/>
+                </a:highlight>
+                <a:latin typeface="Consolas" panose="020B0609020204030204" pitchFamily="49" charset="0"/>
+              </a:rPr>
+              <a:t>0</a:t>
+            </a:r>
+            <a:endParaRPr lang="en-SG" b="0" dirty="0">
+              <a:solidFill>
+                <a:srgbClr val="000000"/>
+              </a:solidFill>
+              <a:effectLst/>
+              <a:highlight>
+                <a:srgbClr val="D6E0EB"/>
+              </a:highlight>
+              <a:latin typeface="Consolas" panose="020B0609020204030204" pitchFamily="49" charset="0"/>
+            </a:endParaRPr>
+          </a:p>
+          <a:p>
+            <a:r>
+              <a:rPr lang="en-SG" b="0" dirty="0">
+                <a:solidFill>
+                  <a:srgbClr val="000000"/>
+                </a:solidFill>
+                <a:effectLst/>
+                <a:highlight>
+                  <a:srgbClr val="D6E0EB"/>
+                </a:highlight>
+                <a:latin typeface="Consolas" panose="020B0609020204030204" pitchFamily="49" charset="0"/>
+              </a:rPr>
+              <a:t>    </a:t>
+            </a:r>
+            <a:r>
+              <a:rPr lang="en-SG" b="0" dirty="0" err="1">
+                <a:solidFill>
+                  <a:srgbClr val="001080"/>
+                </a:solidFill>
+                <a:effectLst/>
+                <a:highlight>
+                  <a:srgbClr val="D6E0EB"/>
+                </a:highlight>
+                <a:latin typeface="Consolas" panose="020B0609020204030204" pitchFamily="49" charset="0"/>
+              </a:rPr>
+              <a:t>sampling_strategy</a:t>
+            </a:r>
+            <a:r>
+              <a:rPr lang="en-SG" b="0" dirty="0">
+                <a:solidFill>
+                  <a:srgbClr val="000000"/>
+                </a:solidFill>
+                <a:effectLst/>
+                <a:highlight>
+                  <a:srgbClr val="D6E0EB"/>
+                </a:highlight>
+                <a:latin typeface="Consolas" panose="020B0609020204030204" pitchFamily="49" charset="0"/>
+              </a:rPr>
+              <a:t>=</a:t>
+            </a:r>
+            <a:r>
+              <a:rPr lang="en-SG" b="0" dirty="0">
+                <a:solidFill>
+                  <a:srgbClr val="098658"/>
+                </a:solidFill>
+                <a:effectLst/>
+                <a:highlight>
+                  <a:srgbClr val="D6E0EB"/>
+                </a:highlight>
+                <a:latin typeface="Consolas" panose="020B0609020204030204" pitchFamily="49" charset="0"/>
+              </a:rPr>
+              <a:t>.42</a:t>
+            </a:r>
+            <a:endParaRPr lang="en-SG" b="0" dirty="0">
+              <a:solidFill>
+                <a:srgbClr val="000000"/>
+              </a:solidFill>
+              <a:effectLst/>
+              <a:highlight>
+                <a:srgbClr val="D6E0EB"/>
+              </a:highlight>
+              <a:latin typeface="Consolas" panose="020B0609020204030204" pitchFamily="49" charset="0"/>
+            </a:endParaRPr>
+          </a:p>
+          <a:p>
+            <a:r>
+              <a:rPr lang="en-SG" b="0" dirty="0">
+                <a:solidFill>
+                  <a:srgbClr val="000000"/>
+                </a:solidFill>
+                <a:effectLst/>
+                <a:highlight>
+                  <a:srgbClr val="D6E0EB"/>
+                </a:highlight>
+                <a:latin typeface="Consolas" panose="020B0609020204030204" pitchFamily="49" charset="0"/>
+              </a:rPr>
+              <a:t>    </a:t>
+            </a:r>
+            <a:r>
+              <a:rPr lang="en-SG" b="0" dirty="0" err="1">
+                <a:solidFill>
+                  <a:srgbClr val="001080"/>
+                </a:solidFill>
+                <a:effectLst/>
+                <a:highlight>
+                  <a:srgbClr val="D6E0EB"/>
+                </a:highlight>
+                <a:latin typeface="Consolas" panose="020B0609020204030204" pitchFamily="49" charset="0"/>
+              </a:rPr>
+              <a:t>x_oversample</a:t>
+            </a:r>
+            <a:r>
+              <a:rPr lang="en-SG" b="0" dirty="0">
+                <a:solidFill>
+                  <a:srgbClr val="000000"/>
+                </a:solidFill>
+                <a:effectLst/>
+                <a:highlight>
+                  <a:srgbClr val="D6E0EB"/>
+                </a:highlight>
+                <a:latin typeface="Consolas" panose="020B0609020204030204" pitchFamily="49" charset="0"/>
+              </a:rPr>
+              <a:t>, </a:t>
+            </a:r>
+            <a:r>
+              <a:rPr lang="en-SG" b="0" dirty="0" err="1">
+                <a:solidFill>
+                  <a:srgbClr val="001080"/>
+                </a:solidFill>
+                <a:effectLst/>
+                <a:highlight>
+                  <a:srgbClr val="D6E0EB"/>
+                </a:highlight>
+                <a:latin typeface="Consolas" panose="020B0609020204030204" pitchFamily="49" charset="0"/>
+              </a:rPr>
+              <a:t>y_oversample</a:t>
+            </a:r>
+            <a:r>
+              <a:rPr lang="en-SG" b="0" dirty="0">
+                <a:solidFill>
+                  <a:srgbClr val="000000"/>
+                </a:solidFill>
+                <a:effectLst/>
+                <a:highlight>
+                  <a:srgbClr val="D6E0EB"/>
+                </a:highlight>
+                <a:latin typeface="Consolas" panose="020B0609020204030204" pitchFamily="49" charset="0"/>
+              </a:rPr>
+              <a:t> = </a:t>
+            </a:r>
+            <a:r>
+              <a:rPr lang="en-SG" b="0" dirty="0" err="1">
+                <a:solidFill>
+                  <a:srgbClr val="795E26"/>
+                </a:solidFill>
+                <a:effectLst/>
+                <a:highlight>
+                  <a:srgbClr val="D6E0EB"/>
+                </a:highlight>
+                <a:latin typeface="Consolas" panose="020B0609020204030204" pitchFamily="49" charset="0"/>
+              </a:rPr>
+              <a:t>sample_imbalanced_data</a:t>
+            </a:r>
+            <a:r>
+              <a:rPr lang="en-SG" b="0" dirty="0">
+                <a:solidFill>
+                  <a:srgbClr val="000000"/>
+                </a:solidFill>
+                <a:effectLst/>
+                <a:highlight>
+                  <a:srgbClr val="D6E0EB"/>
+                </a:highlight>
+                <a:latin typeface="Consolas" panose="020B0609020204030204" pitchFamily="49" charset="0"/>
+              </a:rPr>
+              <a:t>(</a:t>
+            </a:r>
+            <a:r>
+              <a:rPr lang="en-SG" b="0" dirty="0" err="1">
+                <a:solidFill>
+                  <a:srgbClr val="001080"/>
+                </a:solidFill>
+                <a:effectLst/>
+                <a:highlight>
+                  <a:srgbClr val="D6E0EB"/>
+                </a:highlight>
+                <a:latin typeface="Consolas" panose="020B0609020204030204" pitchFamily="49" charset="0"/>
+              </a:rPr>
+              <a:t>X_train</a:t>
+            </a:r>
+            <a:r>
+              <a:rPr lang="en-SG" b="0" dirty="0" err="1">
+                <a:solidFill>
+                  <a:srgbClr val="000000"/>
+                </a:solidFill>
+                <a:effectLst/>
+                <a:highlight>
+                  <a:srgbClr val="D6E0EB"/>
+                </a:highlight>
+                <a:latin typeface="Consolas" panose="020B0609020204030204" pitchFamily="49" charset="0"/>
+              </a:rPr>
+              <a:t>,</a:t>
+            </a:r>
+            <a:r>
+              <a:rPr lang="en-SG" b="0" dirty="0" err="1">
+                <a:solidFill>
+                  <a:srgbClr val="001080"/>
+                </a:solidFill>
+                <a:effectLst/>
+                <a:highlight>
+                  <a:srgbClr val="D6E0EB"/>
+                </a:highlight>
+                <a:latin typeface="Consolas" panose="020B0609020204030204" pitchFamily="49" charset="0"/>
+              </a:rPr>
+              <a:t>y_train</a:t>
+            </a:r>
+            <a:r>
+              <a:rPr lang="en-SG" b="0" dirty="0">
+                <a:solidFill>
+                  <a:srgbClr val="000000"/>
+                </a:solidFill>
+                <a:effectLst/>
+                <a:highlight>
+                  <a:srgbClr val="D6E0EB"/>
+                </a:highlight>
+                <a:latin typeface="Consolas" panose="020B0609020204030204" pitchFamily="49" charset="0"/>
+              </a:rPr>
+              <a:t>, </a:t>
+            </a:r>
+            <a:r>
+              <a:rPr lang="en-SG" b="0" dirty="0" err="1">
+                <a:solidFill>
+                  <a:srgbClr val="001080"/>
+                </a:solidFill>
+                <a:effectLst/>
+                <a:highlight>
+                  <a:srgbClr val="D6E0EB"/>
+                </a:highlight>
+                <a:latin typeface="Consolas" panose="020B0609020204030204" pitchFamily="49" charset="0"/>
+              </a:rPr>
+              <a:t>sampling_method</a:t>
+            </a:r>
+            <a:r>
+              <a:rPr lang="en-SG" b="0" dirty="0">
+                <a:solidFill>
+                  <a:srgbClr val="000000"/>
+                </a:solidFill>
+                <a:effectLst/>
+                <a:highlight>
+                  <a:srgbClr val="D6E0EB"/>
+                </a:highlight>
+                <a:latin typeface="Consolas" panose="020B0609020204030204" pitchFamily="49" charset="0"/>
+              </a:rPr>
+              <a:t>, </a:t>
+            </a:r>
+            <a:r>
+              <a:rPr lang="en-SG" b="0" dirty="0" err="1">
+                <a:solidFill>
+                  <a:srgbClr val="001080"/>
+                </a:solidFill>
+                <a:effectLst/>
+                <a:highlight>
+                  <a:srgbClr val="D6E0EB"/>
+                </a:highlight>
+                <a:latin typeface="Consolas" panose="020B0609020204030204" pitchFamily="49" charset="0"/>
+              </a:rPr>
+              <a:t>sampling_strategy</a:t>
+            </a:r>
+            <a:r>
+              <a:rPr lang="en-SG" b="0" dirty="0">
+                <a:solidFill>
+                  <a:srgbClr val="000000"/>
+                </a:solidFill>
+                <a:effectLst/>
+                <a:highlight>
+                  <a:srgbClr val="D6E0EB"/>
+                </a:highlight>
+                <a:latin typeface="Consolas" panose="020B0609020204030204" pitchFamily="49" charset="0"/>
+              </a:rPr>
+              <a:t>=</a:t>
+            </a:r>
+            <a:r>
+              <a:rPr lang="en-SG" b="0" dirty="0" err="1">
+                <a:solidFill>
+                  <a:srgbClr val="001080"/>
+                </a:solidFill>
+                <a:effectLst/>
+                <a:highlight>
+                  <a:srgbClr val="D6E0EB"/>
+                </a:highlight>
+                <a:latin typeface="Consolas" panose="020B0609020204030204" pitchFamily="49" charset="0"/>
+              </a:rPr>
+              <a:t>sampling_strategy</a:t>
+            </a:r>
+            <a:r>
+              <a:rPr lang="en-SG" b="0" dirty="0">
+                <a:solidFill>
+                  <a:srgbClr val="000000"/>
+                </a:solidFill>
+                <a:effectLst/>
+                <a:highlight>
+                  <a:srgbClr val="D6E0EB"/>
+                </a:highlight>
+                <a:latin typeface="Consolas" panose="020B0609020204030204" pitchFamily="49" charset="0"/>
+              </a:rPr>
+              <a:t>)</a:t>
+            </a:r>
+          </a:p>
+          <a:p>
+            <a:r>
+              <a:rPr lang="en-SG" b="0" dirty="0">
+                <a:solidFill>
+                  <a:srgbClr val="000000"/>
+                </a:solidFill>
+                <a:effectLst/>
+                <a:highlight>
+                  <a:srgbClr val="D6E0EB"/>
+                </a:highlight>
+                <a:latin typeface="Consolas" panose="020B0609020204030204" pitchFamily="49" charset="0"/>
+              </a:rPr>
+              <a:t>    </a:t>
+            </a:r>
+            <a:r>
+              <a:rPr lang="en-SG" b="0" dirty="0">
+                <a:solidFill>
+                  <a:srgbClr val="008000"/>
+                </a:solidFill>
+                <a:effectLst/>
+                <a:highlight>
+                  <a:srgbClr val="D6E0EB"/>
+                </a:highlight>
+                <a:latin typeface="Consolas" panose="020B0609020204030204" pitchFamily="49" charset="0"/>
+              </a:rPr>
+              <a:t># </a:t>
+            </a:r>
+            <a:r>
+              <a:rPr lang="en-SG" b="0" dirty="0" err="1">
+                <a:solidFill>
+                  <a:srgbClr val="008000"/>
+                </a:solidFill>
+                <a:effectLst/>
+                <a:highlight>
+                  <a:srgbClr val="D6E0EB"/>
+                </a:highlight>
+                <a:latin typeface="Consolas" panose="020B0609020204030204" pitchFamily="49" charset="0"/>
+              </a:rPr>
+              <a:t>X_test,y_test</a:t>
+            </a:r>
+            <a:r>
+              <a:rPr lang="en-SG" b="0" dirty="0">
+                <a:solidFill>
+                  <a:srgbClr val="008000"/>
+                </a:solidFill>
+                <a:effectLst/>
+                <a:highlight>
+                  <a:srgbClr val="D6E0EB"/>
+                </a:highlight>
+                <a:latin typeface="Consolas" panose="020B0609020204030204" pitchFamily="49" charset="0"/>
+              </a:rPr>
+              <a:t> = </a:t>
+            </a:r>
+            <a:r>
+              <a:rPr lang="en-SG" b="0" dirty="0" err="1">
+                <a:solidFill>
+                  <a:srgbClr val="008000"/>
+                </a:solidFill>
+                <a:effectLst/>
+                <a:highlight>
+                  <a:srgbClr val="D6E0EB"/>
+                </a:highlight>
+                <a:latin typeface="Consolas" panose="020B0609020204030204" pitchFamily="49" charset="0"/>
+              </a:rPr>
+              <a:t>sample_imbalanced_data</a:t>
+            </a:r>
+            <a:r>
+              <a:rPr lang="en-SG" b="0" dirty="0">
+                <a:solidFill>
+                  <a:srgbClr val="008000"/>
+                </a:solidFill>
+                <a:effectLst/>
+                <a:highlight>
+                  <a:srgbClr val="D6E0EB"/>
+                </a:highlight>
+                <a:latin typeface="Consolas" panose="020B0609020204030204" pitchFamily="49" charset="0"/>
+              </a:rPr>
+              <a:t>(</a:t>
+            </a:r>
+            <a:r>
+              <a:rPr lang="en-SG" b="0" dirty="0" err="1">
+                <a:solidFill>
+                  <a:srgbClr val="008000"/>
+                </a:solidFill>
+                <a:effectLst/>
+                <a:highlight>
+                  <a:srgbClr val="D6E0EB"/>
+                </a:highlight>
+                <a:latin typeface="Consolas" panose="020B0609020204030204" pitchFamily="49" charset="0"/>
+              </a:rPr>
+              <a:t>X_test,y_test</a:t>
+            </a:r>
+            <a:r>
+              <a:rPr lang="en-SG" b="0" dirty="0">
+                <a:solidFill>
+                  <a:srgbClr val="008000"/>
+                </a:solidFill>
+                <a:effectLst/>
+                <a:highlight>
+                  <a:srgbClr val="D6E0EB"/>
+                </a:highlight>
+                <a:latin typeface="Consolas" panose="020B0609020204030204" pitchFamily="49" charset="0"/>
+              </a:rPr>
+              <a:t>, 0, </a:t>
+            </a:r>
+            <a:r>
+              <a:rPr lang="en-SG" b="0" dirty="0" err="1">
+                <a:solidFill>
+                  <a:srgbClr val="008000"/>
+                </a:solidFill>
+                <a:effectLst/>
+                <a:highlight>
+                  <a:srgbClr val="D6E0EB"/>
+                </a:highlight>
+                <a:latin typeface="Consolas" panose="020B0609020204030204" pitchFamily="49" charset="0"/>
+              </a:rPr>
+              <a:t>sampling_strategy</a:t>
+            </a:r>
+            <a:r>
+              <a:rPr lang="en-SG" b="0" dirty="0">
+                <a:solidFill>
+                  <a:srgbClr val="008000"/>
+                </a:solidFill>
+                <a:effectLst/>
+                <a:highlight>
+                  <a:srgbClr val="D6E0EB"/>
+                </a:highlight>
+                <a:latin typeface="Consolas" panose="020B0609020204030204" pitchFamily="49" charset="0"/>
+              </a:rPr>
+              <a:t>=</a:t>
+            </a:r>
+            <a:r>
+              <a:rPr lang="en-SG" b="0" dirty="0" err="1">
+                <a:solidFill>
+                  <a:srgbClr val="008000"/>
+                </a:solidFill>
+                <a:effectLst/>
+                <a:highlight>
+                  <a:srgbClr val="D6E0EB"/>
+                </a:highlight>
+                <a:latin typeface="Consolas" panose="020B0609020204030204" pitchFamily="49" charset="0"/>
+              </a:rPr>
+              <a:t>sampling_strategy</a:t>
+            </a:r>
+            <a:r>
+              <a:rPr lang="en-SG" b="0" dirty="0">
+                <a:solidFill>
+                  <a:srgbClr val="008000"/>
+                </a:solidFill>
+                <a:effectLst/>
+                <a:highlight>
+                  <a:srgbClr val="D6E0EB"/>
+                </a:highlight>
+                <a:latin typeface="Consolas" panose="020B0609020204030204" pitchFamily="49" charset="0"/>
+              </a:rPr>
+              <a:t>)</a:t>
+            </a:r>
+            <a:endParaRPr lang="en-SG" b="0" dirty="0">
+              <a:solidFill>
+                <a:srgbClr val="000000"/>
+              </a:solidFill>
+              <a:effectLst/>
+              <a:highlight>
+                <a:srgbClr val="D6E0EB"/>
+              </a:highlight>
+              <a:latin typeface="Consolas" panose="020B0609020204030204" pitchFamily="49" charset="0"/>
+            </a:endParaRPr>
+          </a:p>
+          <a:p>
+            <a:r>
+              <a:rPr lang="en-SG" b="0" dirty="0">
+                <a:solidFill>
+                  <a:srgbClr val="000000"/>
+                </a:solidFill>
+                <a:effectLst/>
+                <a:highlight>
+                  <a:srgbClr val="D6E0EB"/>
+                </a:highlight>
+                <a:latin typeface="Consolas" panose="020B0609020204030204" pitchFamily="49" charset="0"/>
+              </a:rPr>
+              <a:t>    </a:t>
+            </a:r>
+            <a:r>
+              <a:rPr lang="en-SG" b="0" dirty="0" err="1">
+                <a:solidFill>
+                  <a:srgbClr val="001080"/>
+                </a:solidFill>
+                <a:effectLst/>
+                <a:highlight>
+                  <a:srgbClr val="D6E0EB"/>
+                </a:highlight>
+                <a:latin typeface="Consolas" panose="020B0609020204030204" pitchFamily="49" charset="0"/>
+              </a:rPr>
+              <a:t>min_samples_leaf</a:t>
+            </a:r>
+            <a:r>
+              <a:rPr lang="en-SG" b="0" dirty="0">
+                <a:solidFill>
+                  <a:srgbClr val="000000"/>
+                </a:solidFill>
+                <a:effectLst/>
+                <a:highlight>
+                  <a:srgbClr val="D6E0EB"/>
+                </a:highlight>
+                <a:latin typeface="Consolas" panose="020B0609020204030204" pitchFamily="49" charset="0"/>
+              </a:rPr>
+              <a:t>=</a:t>
+            </a:r>
+            <a:r>
+              <a:rPr lang="en-SG" b="0" dirty="0">
+                <a:solidFill>
+                  <a:srgbClr val="098658"/>
+                </a:solidFill>
+                <a:effectLst/>
+                <a:highlight>
+                  <a:srgbClr val="D6E0EB"/>
+                </a:highlight>
+                <a:latin typeface="Consolas" panose="020B0609020204030204" pitchFamily="49" charset="0"/>
+              </a:rPr>
+              <a:t>10</a:t>
+            </a:r>
+            <a:endParaRPr lang="en-SG" b="0" dirty="0">
+              <a:solidFill>
+                <a:srgbClr val="000000"/>
+              </a:solidFill>
+              <a:effectLst/>
+              <a:highlight>
+                <a:srgbClr val="D6E0EB"/>
+              </a:highlight>
+              <a:latin typeface="Consolas" panose="020B0609020204030204" pitchFamily="49" charset="0"/>
+            </a:endParaRPr>
+          </a:p>
+          <a:p>
+            <a:r>
+              <a:rPr lang="en-SG" b="0" dirty="0">
+                <a:solidFill>
+                  <a:srgbClr val="000000"/>
+                </a:solidFill>
+                <a:effectLst/>
+                <a:highlight>
+                  <a:srgbClr val="D6E0EB"/>
+                </a:highlight>
+                <a:latin typeface="Consolas" panose="020B0609020204030204" pitchFamily="49" charset="0"/>
+              </a:rPr>
+              <a:t>    </a:t>
+            </a:r>
+            <a:r>
+              <a:rPr lang="en-SG" b="0" dirty="0" err="1">
+                <a:solidFill>
+                  <a:srgbClr val="001080"/>
+                </a:solidFill>
+                <a:effectLst/>
+                <a:highlight>
+                  <a:srgbClr val="D6E0EB"/>
+                </a:highlight>
+                <a:latin typeface="Consolas" panose="020B0609020204030204" pitchFamily="49" charset="0"/>
+              </a:rPr>
+              <a:t>max_depth</a:t>
+            </a:r>
+            <a:r>
+              <a:rPr lang="en-SG" b="0" dirty="0">
+                <a:solidFill>
+                  <a:srgbClr val="000000"/>
+                </a:solidFill>
+                <a:effectLst/>
+                <a:highlight>
+                  <a:srgbClr val="D6E0EB"/>
+                </a:highlight>
+                <a:latin typeface="Consolas" panose="020B0609020204030204" pitchFamily="49" charset="0"/>
+              </a:rPr>
+              <a:t>=</a:t>
+            </a:r>
+            <a:r>
+              <a:rPr lang="en-SG" dirty="0">
+                <a:solidFill>
+                  <a:srgbClr val="098658"/>
+                </a:solidFill>
+                <a:highlight>
+                  <a:srgbClr val="D6E0EB"/>
+                </a:highlight>
+                <a:latin typeface="Consolas" panose="020B0609020204030204" pitchFamily="49" charset="0"/>
+              </a:rPr>
+              <a:t>7</a:t>
+            </a:r>
+            <a:endParaRPr lang="en-SG" b="0" dirty="0">
+              <a:solidFill>
+                <a:srgbClr val="000000"/>
+              </a:solidFill>
+              <a:effectLst/>
+              <a:highlight>
+                <a:srgbClr val="D6E0EB"/>
+              </a:highlight>
+              <a:latin typeface="Consolas" panose="020B0609020204030204" pitchFamily="49" charset="0"/>
+            </a:endParaRPr>
+          </a:p>
+          <a:p>
+            <a:r>
+              <a:rPr lang="en-SG" b="0" dirty="0">
+                <a:solidFill>
+                  <a:srgbClr val="000000"/>
+                </a:solidFill>
+                <a:effectLst/>
+                <a:highlight>
+                  <a:srgbClr val="D6E0EB"/>
+                </a:highlight>
+                <a:latin typeface="Consolas" panose="020B0609020204030204" pitchFamily="49" charset="0"/>
+              </a:rPr>
+              <a:t>    </a:t>
+            </a:r>
+            <a:r>
+              <a:rPr lang="en-SG" b="0" dirty="0">
+                <a:solidFill>
+                  <a:srgbClr val="001080"/>
+                </a:solidFill>
+                <a:effectLst/>
+                <a:highlight>
+                  <a:srgbClr val="D6E0EB"/>
+                </a:highlight>
+                <a:latin typeface="Consolas" panose="020B0609020204030204" pitchFamily="49" charset="0"/>
+              </a:rPr>
+              <a:t>estimators</a:t>
+            </a:r>
+            <a:r>
+              <a:rPr lang="en-SG" b="0" dirty="0">
+                <a:solidFill>
+                  <a:srgbClr val="000000"/>
+                </a:solidFill>
+                <a:effectLst/>
+                <a:highlight>
+                  <a:srgbClr val="D6E0EB"/>
+                </a:highlight>
+                <a:latin typeface="Consolas" panose="020B0609020204030204" pitchFamily="49" charset="0"/>
+              </a:rPr>
+              <a:t>=</a:t>
+            </a:r>
+            <a:r>
+              <a:rPr lang="en-SG" b="0" dirty="0">
+                <a:solidFill>
+                  <a:srgbClr val="098658"/>
+                </a:solidFill>
+                <a:effectLst/>
+                <a:highlight>
+                  <a:srgbClr val="D6E0EB"/>
+                </a:highlight>
+                <a:latin typeface="Consolas" panose="020B0609020204030204" pitchFamily="49" charset="0"/>
+              </a:rPr>
+              <a:t>50</a:t>
+            </a:r>
+            <a:endParaRPr lang="en-SG" b="0" dirty="0">
+              <a:solidFill>
+                <a:srgbClr val="000000"/>
+              </a:solidFill>
+              <a:effectLst/>
+              <a:highlight>
+                <a:srgbClr val="D6E0EB"/>
+              </a:highlight>
+              <a:latin typeface="Consolas" panose="020B0609020204030204" pitchFamily="49" charset="0"/>
+            </a:endParaRPr>
+          </a:p>
+          <a:p>
+            <a:r>
+              <a:rPr lang="en-SG" b="0" dirty="0">
+                <a:solidFill>
+                  <a:srgbClr val="000000"/>
+                </a:solidFill>
+                <a:effectLst/>
+                <a:highlight>
+                  <a:srgbClr val="D6E0EB"/>
+                </a:highlight>
+                <a:latin typeface="Consolas" panose="020B0609020204030204" pitchFamily="49" charset="0"/>
+              </a:rPr>
+              <a:t>    </a:t>
+            </a:r>
+            <a:r>
+              <a:rPr lang="en-SG" b="0" dirty="0" err="1">
+                <a:solidFill>
+                  <a:srgbClr val="001080"/>
+                </a:solidFill>
+                <a:effectLst/>
+                <a:highlight>
+                  <a:srgbClr val="D6E0EB"/>
+                </a:highlight>
+                <a:latin typeface="Consolas" panose="020B0609020204030204" pitchFamily="49" charset="0"/>
+              </a:rPr>
+              <a:t>samples_leaf_sizes</a:t>
+            </a:r>
+            <a:r>
+              <a:rPr lang="en-SG" b="0" dirty="0">
+                <a:solidFill>
+                  <a:srgbClr val="000000"/>
+                </a:solidFill>
+                <a:effectLst/>
+                <a:highlight>
+                  <a:srgbClr val="D6E0EB"/>
+                </a:highlight>
+                <a:latin typeface="Consolas" panose="020B0609020204030204" pitchFamily="49" charset="0"/>
+              </a:rPr>
+              <a:t> = [</a:t>
+            </a:r>
+            <a:r>
+              <a:rPr lang="en-SG" b="0" dirty="0">
+                <a:solidFill>
+                  <a:srgbClr val="098658"/>
+                </a:solidFill>
+                <a:effectLst/>
+                <a:highlight>
+                  <a:srgbClr val="D6E0EB"/>
+                </a:highlight>
+                <a:latin typeface="Consolas" panose="020B0609020204030204" pitchFamily="49" charset="0"/>
+              </a:rPr>
+              <a:t>2</a:t>
+            </a:r>
+            <a:r>
+              <a:rPr lang="en-SG" b="0" dirty="0">
+                <a:solidFill>
+                  <a:srgbClr val="000000"/>
+                </a:solidFill>
+                <a:effectLst/>
+                <a:highlight>
+                  <a:srgbClr val="D6E0EB"/>
+                </a:highlight>
+                <a:latin typeface="Consolas" panose="020B0609020204030204" pitchFamily="49" charset="0"/>
+              </a:rPr>
+              <a:t>,</a:t>
+            </a:r>
+            <a:r>
+              <a:rPr lang="en-SG" b="0" dirty="0">
+                <a:solidFill>
+                  <a:srgbClr val="098658"/>
+                </a:solidFill>
+                <a:effectLst/>
+                <a:highlight>
+                  <a:srgbClr val="D6E0EB"/>
+                </a:highlight>
+                <a:latin typeface="Consolas" panose="020B0609020204030204" pitchFamily="49" charset="0"/>
+              </a:rPr>
+              <a:t>4</a:t>
+            </a:r>
+            <a:r>
+              <a:rPr lang="en-SG" b="0" dirty="0">
+                <a:solidFill>
+                  <a:srgbClr val="000000"/>
+                </a:solidFill>
+                <a:effectLst/>
+                <a:highlight>
+                  <a:srgbClr val="D6E0EB"/>
+                </a:highlight>
+                <a:latin typeface="Consolas" panose="020B0609020204030204" pitchFamily="49" charset="0"/>
+              </a:rPr>
+              <a:t>,</a:t>
+            </a:r>
+            <a:r>
+              <a:rPr lang="en-SG" b="0" dirty="0">
+                <a:solidFill>
+                  <a:srgbClr val="098658"/>
+                </a:solidFill>
+                <a:effectLst/>
+                <a:highlight>
+                  <a:srgbClr val="D6E0EB"/>
+                </a:highlight>
+                <a:latin typeface="Consolas" panose="020B0609020204030204" pitchFamily="49" charset="0"/>
+              </a:rPr>
+              <a:t>6</a:t>
+            </a:r>
+            <a:r>
+              <a:rPr lang="en-SG" b="0" dirty="0">
+                <a:solidFill>
+                  <a:srgbClr val="000000"/>
+                </a:solidFill>
+                <a:effectLst/>
+                <a:highlight>
+                  <a:srgbClr val="D6E0EB"/>
+                </a:highlight>
+                <a:latin typeface="Consolas" panose="020B0609020204030204" pitchFamily="49" charset="0"/>
+              </a:rPr>
+              <a:t>,</a:t>
+            </a:r>
+            <a:r>
+              <a:rPr lang="en-SG" b="0" dirty="0">
+                <a:solidFill>
+                  <a:srgbClr val="098658"/>
+                </a:solidFill>
+                <a:effectLst/>
+                <a:highlight>
+                  <a:srgbClr val="D6E0EB"/>
+                </a:highlight>
+                <a:latin typeface="Consolas" panose="020B0609020204030204" pitchFamily="49" charset="0"/>
+              </a:rPr>
+              <a:t>7</a:t>
+            </a:r>
+            <a:r>
+              <a:rPr lang="en-SG" b="0" dirty="0">
+                <a:solidFill>
+                  <a:srgbClr val="000000"/>
+                </a:solidFill>
+                <a:effectLst/>
+                <a:highlight>
+                  <a:srgbClr val="D6E0EB"/>
+                </a:highlight>
+                <a:latin typeface="Consolas" panose="020B0609020204030204" pitchFamily="49" charset="0"/>
+              </a:rPr>
+              <a:t>,</a:t>
+            </a:r>
+            <a:r>
+              <a:rPr lang="en-SG" b="0" dirty="0">
+                <a:solidFill>
+                  <a:srgbClr val="098658"/>
+                </a:solidFill>
+                <a:effectLst/>
+                <a:highlight>
+                  <a:srgbClr val="D6E0EB"/>
+                </a:highlight>
+                <a:latin typeface="Consolas" panose="020B0609020204030204" pitchFamily="49" charset="0"/>
+              </a:rPr>
+              <a:t>8</a:t>
+            </a:r>
+            <a:r>
+              <a:rPr lang="en-SG" b="0" dirty="0">
+                <a:solidFill>
+                  <a:srgbClr val="000000"/>
+                </a:solidFill>
+                <a:effectLst/>
+                <a:highlight>
+                  <a:srgbClr val="D6E0EB"/>
+                </a:highlight>
+                <a:latin typeface="Consolas" panose="020B0609020204030204" pitchFamily="49" charset="0"/>
+              </a:rPr>
+              <a:t>,</a:t>
+            </a:r>
+            <a:r>
+              <a:rPr lang="en-SG" b="0" dirty="0">
+                <a:solidFill>
+                  <a:srgbClr val="098658"/>
+                </a:solidFill>
+                <a:effectLst/>
+                <a:highlight>
+                  <a:srgbClr val="D6E0EB"/>
+                </a:highlight>
+                <a:latin typeface="Consolas" panose="020B0609020204030204" pitchFamily="49" charset="0"/>
+              </a:rPr>
+              <a:t>10</a:t>
+            </a:r>
+            <a:r>
+              <a:rPr lang="en-SG" b="0" dirty="0">
+                <a:solidFill>
+                  <a:srgbClr val="000000"/>
+                </a:solidFill>
+                <a:effectLst/>
+                <a:highlight>
+                  <a:srgbClr val="D6E0EB"/>
+                </a:highlight>
+                <a:latin typeface="Consolas" panose="020B0609020204030204" pitchFamily="49" charset="0"/>
+              </a:rPr>
+              <a:t>,</a:t>
+            </a:r>
+            <a:r>
+              <a:rPr lang="en-SG" b="0" dirty="0">
+                <a:solidFill>
+                  <a:srgbClr val="098658"/>
+                </a:solidFill>
+                <a:effectLst/>
+                <a:highlight>
+                  <a:srgbClr val="D6E0EB"/>
+                </a:highlight>
+                <a:latin typeface="Consolas" panose="020B0609020204030204" pitchFamily="49" charset="0"/>
+              </a:rPr>
+              <a:t>20</a:t>
+            </a:r>
+            <a:r>
+              <a:rPr lang="en-SG" b="0" dirty="0">
+                <a:solidFill>
+                  <a:srgbClr val="000000"/>
+                </a:solidFill>
+                <a:effectLst/>
+                <a:highlight>
+                  <a:srgbClr val="D6E0EB"/>
+                </a:highlight>
+                <a:latin typeface="Consolas" panose="020B0609020204030204" pitchFamily="49" charset="0"/>
+              </a:rPr>
+              <a:t>,</a:t>
+            </a:r>
+            <a:r>
+              <a:rPr lang="en-SG" b="0" dirty="0">
+                <a:solidFill>
+                  <a:srgbClr val="098658"/>
+                </a:solidFill>
+                <a:effectLst/>
+                <a:highlight>
+                  <a:srgbClr val="D6E0EB"/>
+                </a:highlight>
+                <a:latin typeface="Consolas" panose="020B0609020204030204" pitchFamily="49" charset="0"/>
+              </a:rPr>
+              <a:t>30</a:t>
+            </a:r>
+            <a:r>
+              <a:rPr lang="en-SG" b="0" dirty="0">
+                <a:solidFill>
+                  <a:srgbClr val="000000"/>
+                </a:solidFill>
+                <a:effectLst/>
+                <a:highlight>
+                  <a:srgbClr val="D6E0EB"/>
+                </a:highlight>
+                <a:latin typeface="Consolas" panose="020B0609020204030204" pitchFamily="49" charset="0"/>
+              </a:rPr>
+              <a:t>,</a:t>
+            </a:r>
+            <a:r>
+              <a:rPr lang="en-SG" b="0" dirty="0">
+                <a:solidFill>
+                  <a:srgbClr val="098658"/>
+                </a:solidFill>
+                <a:effectLst/>
+                <a:highlight>
+                  <a:srgbClr val="D6E0EB"/>
+                </a:highlight>
+                <a:latin typeface="Consolas" panose="020B0609020204030204" pitchFamily="49" charset="0"/>
+              </a:rPr>
+              <a:t>40</a:t>
+            </a:r>
+            <a:r>
+              <a:rPr lang="en-SG" b="0" dirty="0">
+                <a:solidFill>
+                  <a:srgbClr val="000000"/>
+                </a:solidFill>
+                <a:effectLst/>
+                <a:highlight>
+                  <a:srgbClr val="D6E0EB"/>
+                </a:highlight>
+                <a:latin typeface="Consolas" panose="020B0609020204030204" pitchFamily="49" charset="0"/>
+              </a:rPr>
+              <a:t>,</a:t>
+            </a:r>
+            <a:r>
+              <a:rPr lang="en-SG" b="0" dirty="0">
+                <a:solidFill>
+                  <a:srgbClr val="098658"/>
+                </a:solidFill>
+                <a:effectLst/>
+                <a:highlight>
+                  <a:srgbClr val="D6E0EB"/>
+                </a:highlight>
+                <a:latin typeface="Consolas" panose="020B0609020204030204" pitchFamily="49" charset="0"/>
+              </a:rPr>
+              <a:t>50</a:t>
+            </a:r>
+            <a:r>
+              <a:rPr lang="en-SG" b="0" dirty="0">
+                <a:solidFill>
+                  <a:srgbClr val="000000"/>
+                </a:solidFill>
+                <a:effectLst/>
+                <a:highlight>
+                  <a:srgbClr val="D6E0EB"/>
+                </a:highlight>
+                <a:latin typeface="Consolas" panose="020B0609020204030204" pitchFamily="49" charset="0"/>
+              </a:rPr>
+              <a:t>]</a:t>
+            </a:r>
+          </a:p>
+          <a:p>
+            <a:r>
+              <a:rPr lang="en-SG" b="0" dirty="0">
+                <a:solidFill>
+                  <a:srgbClr val="000000"/>
+                </a:solidFill>
+                <a:effectLst/>
+                <a:highlight>
+                  <a:srgbClr val="D6E0EB"/>
+                </a:highlight>
+                <a:latin typeface="Consolas" panose="020B0609020204030204" pitchFamily="49" charset="0"/>
+              </a:rPr>
+              <a:t>    </a:t>
+            </a:r>
+            <a:r>
+              <a:rPr lang="en-SG" b="0" dirty="0" err="1">
+                <a:solidFill>
+                  <a:srgbClr val="001080"/>
+                </a:solidFill>
+                <a:effectLst/>
+                <a:highlight>
+                  <a:srgbClr val="D6E0EB"/>
+                </a:highlight>
+                <a:latin typeface="Consolas" panose="020B0609020204030204" pitchFamily="49" charset="0"/>
+              </a:rPr>
+              <a:t>tree_depths</a:t>
+            </a:r>
+            <a:r>
+              <a:rPr lang="en-SG" b="0" dirty="0">
+                <a:solidFill>
+                  <a:srgbClr val="000000"/>
+                </a:solidFill>
+                <a:effectLst/>
+                <a:highlight>
+                  <a:srgbClr val="D6E0EB"/>
+                </a:highlight>
+                <a:latin typeface="Consolas" panose="020B0609020204030204" pitchFamily="49" charset="0"/>
+              </a:rPr>
+              <a:t> = </a:t>
+            </a:r>
+            <a:r>
+              <a:rPr lang="en-SG" b="0" dirty="0">
+                <a:solidFill>
+                  <a:srgbClr val="267F99"/>
+                </a:solidFill>
+                <a:effectLst/>
+                <a:highlight>
+                  <a:srgbClr val="D6E0EB"/>
+                </a:highlight>
+                <a:latin typeface="Consolas" panose="020B0609020204030204" pitchFamily="49" charset="0"/>
+              </a:rPr>
+              <a:t>range</a:t>
+            </a:r>
+            <a:r>
+              <a:rPr lang="en-SG" b="0" dirty="0">
+                <a:solidFill>
+                  <a:srgbClr val="000000"/>
+                </a:solidFill>
+                <a:effectLst/>
+                <a:highlight>
+                  <a:srgbClr val="D6E0EB"/>
+                </a:highlight>
+                <a:latin typeface="Consolas" panose="020B0609020204030204" pitchFamily="49" charset="0"/>
+              </a:rPr>
+              <a:t>(</a:t>
+            </a:r>
+            <a:r>
+              <a:rPr lang="en-SG" b="0" dirty="0">
+                <a:solidFill>
+                  <a:srgbClr val="098658"/>
+                </a:solidFill>
+                <a:effectLst/>
+                <a:highlight>
+                  <a:srgbClr val="D6E0EB"/>
+                </a:highlight>
+                <a:latin typeface="Consolas" panose="020B0609020204030204" pitchFamily="49" charset="0"/>
+              </a:rPr>
+              <a:t>1</a:t>
+            </a:r>
+            <a:r>
+              <a:rPr lang="en-SG" b="0" dirty="0">
+                <a:solidFill>
+                  <a:srgbClr val="000000"/>
+                </a:solidFill>
+                <a:effectLst/>
+                <a:highlight>
+                  <a:srgbClr val="D6E0EB"/>
+                </a:highlight>
+                <a:latin typeface="Consolas" panose="020B0609020204030204" pitchFamily="49" charset="0"/>
+              </a:rPr>
+              <a:t>,</a:t>
+            </a:r>
+            <a:r>
+              <a:rPr lang="en-SG" b="0" dirty="0">
+                <a:solidFill>
+                  <a:srgbClr val="098658"/>
+                </a:solidFill>
+                <a:effectLst/>
+                <a:highlight>
+                  <a:srgbClr val="D6E0EB"/>
+                </a:highlight>
+                <a:latin typeface="Consolas" panose="020B0609020204030204" pitchFamily="49" charset="0"/>
+              </a:rPr>
+              <a:t>25</a:t>
+            </a:r>
+            <a:r>
+              <a:rPr lang="en-SG" b="0" dirty="0">
+                <a:solidFill>
+                  <a:srgbClr val="000000"/>
+                </a:solidFill>
+                <a:effectLst/>
+                <a:highlight>
+                  <a:srgbClr val="D6E0EB"/>
+                </a:highlight>
+                <a:latin typeface="Consolas" panose="020B0609020204030204" pitchFamily="49" charset="0"/>
+              </a:rPr>
+              <a:t>)</a:t>
+            </a:r>
+          </a:p>
+          <a:p>
+            <a:r>
+              <a:rPr lang="en-SG" b="0" dirty="0">
+                <a:solidFill>
+                  <a:srgbClr val="000000"/>
+                </a:solidFill>
+                <a:effectLst/>
+                <a:highlight>
+                  <a:srgbClr val="D6E0EB"/>
+                </a:highlight>
+                <a:latin typeface="Consolas" panose="020B0609020204030204" pitchFamily="49" charset="0"/>
+              </a:rPr>
+              <a:t>    </a:t>
+            </a:r>
+            <a:r>
+              <a:rPr lang="en-SG" b="0" dirty="0" err="1">
+                <a:solidFill>
+                  <a:srgbClr val="001080"/>
+                </a:solidFill>
+                <a:effectLst/>
+                <a:highlight>
+                  <a:srgbClr val="D6E0EB"/>
+                </a:highlight>
+                <a:latin typeface="Consolas" panose="020B0609020204030204" pitchFamily="49" charset="0"/>
+              </a:rPr>
+              <a:t>class_weight</a:t>
+            </a:r>
+            <a:r>
+              <a:rPr lang="en-SG" b="0" dirty="0">
+                <a:solidFill>
+                  <a:srgbClr val="000000"/>
+                </a:solidFill>
+                <a:effectLst/>
+                <a:highlight>
+                  <a:srgbClr val="D6E0EB"/>
+                </a:highlight>
+                <a:latin typeface="Consolas" panose="020B0609020204030204" pitchFamily="49" charset="0"/>
+              </a:rPr>
+              <a:t>=</a:t>
+            </a:r>
+            <a:r>
+              <a:rPr lang="en-SG" b="0" dirty="0">
+                <a:solidFill>
+                  <a:srgbClr val="A31515"/>
+                </a:solidFill>
+                <a:effectLst/>
+                <a:highlight>
+                  <a:srgbClr val="D6E0EB"/>
+                </a:highlight>
+                <a:latin typeface="Consolas" panose="020B0609020204030204" pitchFamily="49" charset="0"/>
+              </a:rPr>
+              <a:t>'balanced'</a:t>
+            </a:r>
+            <a:endParaRPr lang="en-SG" b="0" dirty="0">
+              <a:solidFill>
+                <a:srgbClr val="000000"/>
+              </a:solidFill>
+              <a:effectLst/>
+              <a:highlight>
+                <a:srgbClr val="D6E0EB"/>
+              </a:highlight>
+              <a:latin typeface="Consolas" panose="020B0609020204030204" pitchFamily="49" charset="0"/>
+            </a:endParaRPr>
+          </a:p>
+          <a:p>
+            <a:r>
+              <a:rPr lang="en-SG" b="0" dirty="0">
+                <a:solidFill>
+                  <a:srgbClr val="000000"/>
+                </a:solidFill>
+                <a:effectLst/>
+                <a:highlight>
+                  <a:srgbClr val="D6E0EB"/>
+                </a:highlight>
+                <a:latin typeface="Consolas" panose="020B0609020204030204" pitchFamily="49" charset="0"/>
+              </a:rPr>
+              <a:t>    </a:t>
+            </a:r>
+            <a:r>
+              <a:rPr lang="en-SG" b="0" dirty="0" err="1">
+                <a:solidFill>
+                  <a:srgbClr val="001080"/>
+                </a:solidFill>
+                <a:effectLst/>
+                <a:highlight>
+                  <a:srgbClr val="D6E0EB"/>
+                </a:highlight>
+                <a:latin typeface="Consolas" panose="020B0609020204030204" pitchFamily="49" charset="0"/>
+              </a:rPr>
+              <a:t>execute_crossval</a:t>
+            </a:r>
+            <a:r>
+              <a:rPr lang="en-SG" b="0" dirty="0">
+                <a:solidFill>
+                  <a:srgbClr val="000000"/>
+                </a:solidFill>
+                <a:effectLst/>
+                <a:highlight>
+                  <a:srgbClr val="D6E0EB"/>
+                </a:highlight>
+                <a:latin typeface="Consolas" panose="020B0609020204030204" pitchFamily="49" charset="0"/>
+              </a:rPr>
+              <a:t>=</a:t>
+            </a:r>
+            <a:r>
+              <a:rPr lang="en-SG" b="0" dirty="0">
+                <a:solidFill>
+                  <a:srgbClr val="0000FF"/>
+                </a:solidFill>
+                <a:effectLst/>
+                <a:highlight>
+                  <a:srgbClr val="D6E0EB"/>
+                </a:highlight>
+                <a:latin typeface="Consolas" panose="020B0609020204030204" pitchFamily="49" charset="0"/>
+              </a:rPr>
+              <a:t>True</a:t>
+            </a:r>
+            <a:endParaRPr lang="en-SG" b="0" dirty="0">
+              <a:solidFill>
+                <a:srgbClr val="000000"/>
+              </a:solidFill>
+              <a:effectLst/>
+              <a:highlight>
+                <a:srgbClr val="D6E0EB"/>
+              </a:highlight>
+              <a:latin typeface="Consolas" panose="020B0609020204030204" pitchFamily="49" charset="0"/>
+            </a:endParaRPr>
+          </a:p>
+          <a:p>
+            <a:endParaRPr lang="en-SG" dirty="0">
+              <a:highlight>
+                <a:srgbClr val="D6E0EB"/>
+              </a:highlight>
+            </a:endParaRPr>
           </a:p>
         </p:txBody>
       </p:sp>
@@ -27154,7 +27522,7 @@
           <p:cNvPr id="4" name="Title 3">
             <a:extLst>
               <a:ext uri="{FF2B5EF4-FFF2-40B4-BE49-F238E27FC236}">
-                <a16:creationId xmlns:a16="http://schemas.microsoft.com/office/drawing/2014/main" id="{87E801B2-9EE9-4CAB-F991-C50DA3E663DF}"/>
+                <a16:creationId xmlns:a16="http://schemas.microsoft.com/office/drawing/2014/main" id="{71E87949-5C43-3ED6-5168-4CEE07D04D78}"/>
               </a:ext>
             </a:extLst>
           </p:cNvPr>
@@ -27167,7 +27535,7 @@
         </p:nvSpPr>
         <p:spPr>
           <a:xfrm>
-            <a:off x="449970" y="427469"/>
+            <a:off x="368137" y="379439"/>
             <a:ext cx="9823998" cy="1325563"/>
           </a:xfrm>
         </p:spPr>
@@ -27176,9 +27544,10 @@
           <a:lstStyle/>
           <a:p>
             <a:r>
-              <a:rPr lang="en-SG" dirty="0"/>
-              <a:t>ACTUAL SCENARIO</a:t>
-            </a:r>
+              <a:rPr lang="en-US" dirty="0"/>
+              <a:t>UNDERSAMPLE AFTER SPLIT</a:t>
+            </a:r>
+            <a:endParaRPr lang="en-SG" dirty="0"/>
           </a:p>
         </p:txBody>
       </p:sp>
@@ -27187,7 +27556,7 @@
           <p:cNvPr id="5" name="Footer Placeholder 4">
             <a:extLst>
               <a:ext uri="{FF2B5EF4-FFF2-40B4-BE49-F238E27FC236}">
-                <a16:creationId xmlns:a16="http://schemas.microsoft.com/office/drawing/2014/main" id="{4E3463B0-E190-CB7F-BA92-4700CA56505E}"/>
+                <a16:creationId xmlns:a16="http://schemas.microsoft.com/office/drawing/2014/main" id="{5E6C7A0E-F720-87D7-F168-209155662DE4}"/>
               </a:ext>
             </a:extLst>
           </p:cNvPr>
@@ -27211,12 +27580,137 @@
           </a:p>
         </p:txBody>
       </p:sp>
+    </p:spTree>
+    <p:extLst>
+      <p:ext uri="{BB962C8B-B14F-4D97-AF65-F5344CB8AC3E}">
+        <p14:creationId xmlns:p14="http://schemas.microsoft.com/office/powerpoint/2010/main" val="2860544608"/>
+      </p:ext>
+    </p:extLst>
+  </p:cSld>
+  <p:clrMapOvr>
+    <a:masterClrMapping/>
+  </p:clrMapOvr>
+</p:sld>
+</file>
+
+<file path=ppt/slides/slide4.xml><?xml version="1.0" encoding="utf-8"?>
+<p:sld xmlns:a="http://schemas.openxmlformats.org/drawingml/2006/main" xmlns:r="http://schemas.openxmlformats.org/officeDocument/2006/relationships" xmlns:p="http://schemas.openxmlformats.org/presentationml/2006/main">
+  <p:cSld>
+    <p:spTree>
+      <p:nvGrpSpPr>
+        <p:cNvPr id="1" name=""/>
+        <p:cNvGrpSpPr/>
+        <p:nvPr/>
+      </p:nvGrpSpPr>
+      <p:grpSpPr>
+        <a:xfrm>
+          <a:off x="0" y="0"/>
+          <a:ext cx="0" cy="0"/>
+          <a:chOff x="0" y="0"/>
+          <a:chExt cx="0" cy="0"/>
+        </a:xfrm>
+      </p:grpSpPr>
+      <p:sp>
+        <p:nvSpPr>
+          <p:cNvPr id="2" name="Picture Placeholder 1">
+            <a:extLst>
+              <a:ext uri="{FF2B5EF4-FFF2-40B4-BE49-F238E27FC236}">
+                <a16:creationId xmlns:a16="http://schemas.microsoft.com/office/drawing/2014/main" id="{6AFBA7FF-C6E3-B993-CBB3-4906626B84A6}"/>
+              </a:ext>
+            </a:extLst>
+          </p:cNvPr>
+          <p:cNvSpPr>
+            <a:spLocks noGrp="1"/>
+          </p:cNvSpPr>
+          <p:nvPr>
+            <p:ph type="pic" sz="quarter" idx="48"/>
+          </p:nvPr>
+        </p:nvSpPr>
+        <p:spPr/>
+        <p:txBody>
+          <a:bodyPr/>
+          <a:lstStyle/>
+          <a:p>
+            <a:endParaRPr lang="en-SG"/>
+          </a:p>
+        </p:txBody>
+      </p:sp>
+      <p:sp>
+        <p:nvSpPr>
+          <p:cNvPr id="4" name="Title 3">
+            <a:extLst>
+              <a:ext uri="{FF2B5EF4-FFF2-40B4-BE49-F238E27FC236}">
+                <a16:creationId xmlns:a16="http://schemas.microsoft.com/office/drawing/2014/main" id="{87E801B2-9EE9-4CAB-F991-C50DA3E663DF}"/>
+              </a:ext>
+            </a:extLst>
+          </p:cNvPr>
+          <p:cNvSpPr>
+            <a:spLocks noGrp="1"/>
+          </p:cNvSpPr>
+          <p:nvPr>
+            <p:ph type="title"/>
+          </p:nvPr>
+        </p:nvSpPr>
+        <p:spPr>
+          <a:xfrm>
+            <a:off x="449970" y="427469"/>
+            <a:ext cx="9823998" cy="1325563"/>
+          </a:xfrm>
+        </p:spPr>
+        <p:txBody>
+          <a:bodyPr/>
+          <a:lstStyle/>
+          <a:p>
+            <a:r>
+              <a:rPr lang="en-SG" dirty="0"/>
+              <a:t>ACTUAL SCENARIO</a:t>
+            </a:r>
+            <a:br>
+              <a:rPr lang="en-SG" dirty="0"/>
+            </a:br>
+            <a:r>
+              <a:rPr lang="en-US" dirty="0"/>
+              <a:t>weights = 0: 0.1 , 1: 99.9</a:t>
+            </a:r>
+            <a:endParaRPr lang="en-SG" dirty="0"/>
+          </a:p>
+        </p:txBody>
+      </p:sp>
+      <p:sp>
+        <p:nvSpPr>
+          <p:cNvPr id="5" name="Footer Placeholder 4">
+            <a:extLst>
+              <a:ext uri="{FF2B5EF4-FFF2-40B4-BE49-F238E27FC236}">
+                <a16:creationId xmlns:a16="http://schemas.microsoft.com/office/drawing/2014/main" id="{4E3463B0-E190-CB7F-BA92-4700CA56505E}"/>
+              </a:ext>
+            </a:extLst>
+          </p:cNvPr>
+          <p:cNvSpPr>
+            <a:spLocks noGrp="1"/>
+          </p:cNvSpPr>
+          <p:nvPr>
+            <p:ph type="ftr" sz="quarter" idx="49"/>
+          </p:nvPr>
+        </p:nvSpPr>
+        <p:spPr/>
+        <p:txBody>
+          <a:bodyPr/>
+          <a:lstStyle/>
+          <a:p>
+            <a:r>
+              <a:rPr lang="en-US" noProof="0"/>
+              <a:t>Presentation Title</a:t>
+            </a:r>
+            <a:endParaRPr lang="en-US" noProof="0" dirty="0"/>
+          </a:p>
+        </p:txBody>
+      </p:sp>
       <p:pic>
         <p:nvPicPr>
-          <p:cNvPr id="7" name="Picture 6">
-            <a:extLst>
-              <a:ext uri="{FF2B5EF4-FFF2-40B4-BE49-F238E27FC236}">
-                <a16:creationId xmlns:a16="http://schemas.microsoft.com/office/drawing/2014/main" id="{A110BDCF-037F-AAA7-CB92-377C05DD6DD8}"/>
+          <p:cNvPr id="9" name="Picture 8">
+            <a:extLst>
+              <a:ext uri="{FF2B5EF4-FFF2-40B4-BE49-F238E27FC236}">
+                <a16:creationId xmlns:a16="http://schemas.microsoft.com/office/drawing/2014/main" id="{8C1BFF01-DADE-F71D-D68E-C0D372450563}"/>
               </a:ext>
             </a:extLst>
           </p:cNvPr>
@@ -27233,8 +27727,8 @@
         </p:blipFill>
         <p:spPr>
           <a:xfrm>
-            <a:off x="1714381" y="2052559"/>
-            <a:ext cx="3818439" cy="4408279"/>
+            <a:off x="9259562" y="1874094"/>
+            <a:ext cx="4386254" cy="4412945"/>
           </a:xfrm>
           <a:prstGeom prst="rect">
             <a:avLst/>
@@ -27243,10 +27737,10 @@
       </p:pic>
       <p:pic>
         <p:nvPicPr>
-          <p:cNvPr id="9" name="Picture 8">
-            <a:extLst>
-              <a:ext uri="{FF2B5EF4-FFF2-40B4-BE49-F238E27FC236}">
-                <a16:creationId xmlns:a16="http://schemas.microsoft.com/office/drawing/2014/main" id="{8C1BFF01-DADE-F71D-D68E-C0D372450563}"/>
+          <p:cNvPr id="11" name="Picture 10">
+            <a:extLst>
+              <a:ext uri="{FF2B5EF4-FFF2-40B4-BE49-F238E27FC236}">
+                <a16:creationId xmlns:a16="http://schemas.microsoft.com/office/drawing/2014/main" id="{46277163-D52E-B450-B3BA-48263E71FE44}"/>
               </a:ext>
             </a:extLst>
           </p:cNvPr>
@@ -27263,8 +27757,38 @@
         </p:blipFill>
         <p:spPr>
           <a:xfrm>
-            <a:off x="7029546" y="2047893"/>
-            <a:ext cx="4386254" cy="4412945"/>
+            <a:off x="4599432" y="1874094"/>
+            <a:ext cx="5788084" cy="4454758"/>
+          </a:xfrm>
+          <a:prstGeom prst="rect">
+            <a:avLst/>
+          </a:prstGeom>
+        </p:spPr>
+      </p:pic>
+      <p:pic>
+        <p:nvPicPr>
+          <p:cNvPr id="13" name="Picture 12">
+            <a:extLst>
+              <a:ext uri="{FF2B5EF4-FFF2-40B4-BE49-F238E27FC236}">
+                <a16:creationId xmlns:a16="http://schemas.microsoft.com/office/drawing/2014/main" id="{AAAC89AE-6947-0B45-ABC9-47FB6A5AEF22}"/>
+              </a:ext>
+            </a:extLst>
+          </p:cNvPr>
+          <p:cNvPicPr>
+            <a:picLocks noChangeAspect="1"/>
+          </p:cNvPicPr>
+          <p:nvPr/>
+        </p:nvPicPr>
+        <p:blipFill>
+          <a:blip r:embed="rId4"/>
+          <a:stretch>
+            <a:fillRect/>
+          </a:stretch>
+        </p:blipFill>
+        <p:spPr>
+          <a:xfrm>
+            <a:off x="54724" y="1874094"/>
+            <a:ext cx="4114800" cy="4454758"/>
           </a:xfrm>
           <a:prstGeom prst="rect">
             <a:avLst/>
@@ -27284,7 +27808,7 @@
 </p:sld>
 </file>
 
-<file path=ppt/slides/slide4.xml><?xml version="1.0" encoding="utf-8"?>
+<file path=ppt/slides/slide5.xml><?xml version="1.0" encoding="utf-8"?>
 <p:sld xmlns:a="http://schemas.openxmlformats.org/drawingml/2006/main" xmlns:r="http://schemas.openxmlformats.org/officeDocument/2006/relationships" xmlns:p="http://schemas.openxmlformats.org/presentationml/2006/main">
   <p:cSld>
     <p:spTree>
@@ -27448,7 +27972,7 @@
 </p:sld>
 </file>
 
-<file path=ppt/slides/slide5.xml><?xml version="1.0" encoding="utf-8"?>
+<file path=ppt/slides/slide6.xml><?xml version="1.0" encoding="utf-8"?>
 <p:sld xmlns:a="http://schemas.openxmlformats.org/drawingml/2006/main" xmlns:r="http://schemas.openxmlformats.org/officeDocument/2006/relationships" xmlns:p="http://schemas.openxmlformats.org/presentationml/2006/main">
   <p:cSld>
     <p:spTree>
@@ -27612,7 +28136,7 @@
 </p:sld>
 </file>
 
-<file path=ppt/slides/slide6.xml><?xml version="1.0" encoding="utf-8"?>
+<file path=ppt/slides/slide7.xml><?xml version="1.0" encoding="utf-8"?>
 <p:sld xmlns:a="http://schemas.openxmlformats.org/drawingml/2006/main" xmlns:r="http://schemas.openxmlformats.org/officeDocument/2006/relationships" xmlns:p="http://schemas.openxmlformats.org/presentationml/2006/main">
   <p:cSld>
     <p:spTree>
@@ -27776,7 +28300,7 @@
 </p:sld>
 </file>
 
-<file path=ppt/slides/slide7.xml><?xml version="1.0" encoding="utf-8"?>
+<file path=ppt/slides/slide8.xml><?xml version="1.0" encoding="utf-8"?>
 <p:sld xmlns:a="http://schemas.openxmlformats.org/drawingml/2006/main" xmlns:r="http://schemas.openxmlformats.org/officeDocument/2006/relationships" xmlns:p="http://schemas.openxmlformats.org/presentationml/2006/main">
   <p:cSld>
     <p:spTree>
@@ -27995,7 +28519,7 @@
 </p:sld>
 </file>
 
-<file path=ppt/slides/slide8.xml><?xml version="1.0" encoding="utf-8"?>
+<file path=ppt/slides/slide9.xml><?xml version="1.0" encoding="utf-8"?>
 <p:sld xmlns:a="http://schemas.openxmlformats.org/drawingml/2006/main" xmlns:r="http://schemas.openxmlformats.org/officeDocument/2006/relationships" xmlns:p="http://schemas.openxmlformats.org/presentationml/2006/main">
   <p:cSld>
     <p:spTree>
@@ -28116,36 +28640,6 @@
           </a:p>
         </p:txBody>
       </p:sp>
-      <p:pic>
-        <p:nvPicPr>
-          <p:cNvPr id="11" name="Picture 10">
-            <a:extLst>
-              <a:ext uri="{FF2B5EF4-FFF2-40B4-BE49-F238E27FC236}">
-                <a16:creationId xmlns:a16="http://schemas.microsoft.com/office/drawing/2014/main" id="{B3B3D67A-D544-95EA-49C9-544CC1CCDF5E}"/>
-              </a:ext>
-            </a:extLst>
-          </p:cNvPr>
-          <p:cNvPicPr>
-            <a:picLocks noChangeAspect="1"/>
-          </p:cNvPicPr>
-          <p:nvPr/>
-        </p:nvPicPr>
-        <p:blipFill>
-          <a:blip r:embed="rId2"/>
-          <a:stretch>
-            <a:fillRect/>
-          </a:stretch>
-        </p:blipFill>
-        <p:spPr>
-          <a:xfrm>
-            <a:off x="190500" y="1143000"/>
-            <a:ext cx="11811000" cy="4572000"/>
-          </a:xfrm>
-          <a:prstGeom prst="rect">
-            <a:avLst/>
-          </a:prstGeom>
-        </p:spPr>
-      </p:pic>
       <p:sp>
         <p:nvSpPr>
           <p:cNvPr id="13" name="Rectangle: Rounded Corners 12">
@@ -28198,146 +28692,12 @@
           </a:p>
         </p:txBody>
       </p:sp>
-    </p:spTree>
-    <p:extLst>
-      <p:ext uri="{BB962C8B-B14F-4D97-AF65-F5344CB8AC3E}">
-        <p14:creationId xmlns:p14="http://schemas.microsoft.com/office/powerpoint/2010/main" val="2591614879"/>
-      </p:ext>
-    </p:extLst>
-  </p:cSld>
-  <p:clrMapOvr>
-    <a:masterClrMapping/>
-  </p:clrMapOvr>
-</p:sld>
-</file>
-
-<file path=ppt/slides/slide9.xml><?xml version="1.0" encoding="utf-8"?>
-<p:sld xmlns:a="http://schemas.openxmlformats.org/drawingml/2006/main" xmlns:r="http://schemas.openxmlformats.org/officeDocument/2006/relationships" xmlns:p="http://schemas.openxmlformats.org/presentationml/2006/main">
-  <p:cSld>
-    <p:spTree>
-      <p:nvGrpSpPr>
-        <p:cNvPr id="1" name=""/>
-        <p:cNvGrpSpPr/>
-        <p:nvPr/>
-      </p:nvGrpSpPr>
-      <p:grpSpPr>
-        <a:xfrm>
-          <a:off x="0" y="0"/>
-          <a:ext cx="0" cy="0"/>
-          <a:chOff x="0" y="0"/>
-          <a:chExt cx="0" cy="0"/>
-        </a:xfrm>
-      </p:grpSpPr>
-      <p:sp>
-        <p:nvSpPr>
-          <p:cNvPr id="2" name="Picture Placeholder 1">
-            <a:extLst>
-              <a:ext uri="{FF2B5EF4-FFF2-40B4-BE49-F238E27FC236}">
-                <a16:creationId xmlns:a16="http://schemas.microsoft.com/office/drawing/2014/main" id="{2B470D0A-71F0-3443-34B3-EB485460BF74}"/>
-              </a:ext>
-            </a:extLst>
-          </p:cNvPr>
-          <p:cNvSpPr>
-            <a:spLocks noGrp="1"/>
-          </p:cNvSpPr>
-          <p:nvPr>
-            <p:ph type="pic" sz="quarter" idx="48"/>
-          </p:nvPr>
-        </p:nvSpPr>
-        <p:spPr/>
-        <p:txBody>
-          <a:bodyPr/>
-          <a:lstStyle/>
-          <a:p>
-            <a:endParaRPr lang="en-SG"/>
-          </a:p>
-        </p:txBody>
-      </p:sp>
-      <p:sp>
-        <p:nvSpPr>
-          <p:cNvPr id="3" name="Text Placeholder 2">
-            <a:extLst>
-              <a:ext uri="{FF2B5EF4-FFF2-40B4-BE49-F238E27FC236}">
-                <a16:creationId xmlns:a16="http://schemas.microsoft.com/office/drawing/2014/main" id="{7FA05528-E3CB-D8CF-12D1-10169480B229}"/>
-              </a:ext>
-            </a:extLst>
-          </p:cNvPr>
-          <p:cNvSpPr>
-            <a:spLocks noGrp="1"/>
-          </p:cNvSpPr>
-          <p:nvPr>
-            <p:ph type="body" sz="quarter" idx="28"/>
-          </p:nvPr>
-        </p:nvSpPr>
-        <p:spPr/>
-        <p:txBody>
-          <a:bodyPr/>
-          <a:lstStyle/>
-          <a:p>
-            <a:endParaRPr lang="en-SG"/>
-          </a:p>
-        </p:txBody>
-      </p:sp>
-      <p:sp>
-        <p:nvSpPr>
-          <p:cNvPr id="4" name="Title 3">
-            <a:extLst>
-              <a:ext uri="{FF2B5EF4-FFF2-40B4-BE49-F238E27FC236}">
-                <a16:creationId xmlns:a16="http://schemas.microsoft.com/office/drawing/2014/main" id="{6AD6850D-8C96-4EF6-D2D5-9BE72C51CC95}"/>
-              </a:ext>
-            </a:extLst>
-          </p:cNvPr>
-          <p:cNvSpPr>
-            <a:spLocks noGrp="1"/>
-          </p:cNvSpPr>
-          <p:nvPr>
-            <p:ph type="title"/>
-          </p:nvPr>
-        </p:nvSpPr>
-        <p:spPr/>
-        <p:txBody>
-          <a:bodyPr/>
-          <a:lstStyle/>
-          <a:p>
-            <a:endParaRPr lang="en-SG"/>
-          </a:p>
-        </p:txBody>
-      </p:sp>
-      <p:sp>
-        <p:nvSpPr>
-          <p:cNvPr id="5" name="Footer Placeholder 4">
-            <a:extLst>
-              <a:ext uri="{FF2B5EF4-FFF2-40B4-BE49-F238E27FC236}">
-                <a16:creationId xmlns:a16="http://schemas.microsoft.com/office/drawing/2014/main" id="{D7964E7F-0402-5809-9AE7-5B105B2F7F75}"/>
-              </a:ext>
-            </a:extLst>
-          </p:cNvPr>
-          <p:cNvSpPr>
-            <a:spLocks noGrp="1"/>
-          </p:cNvSpPr>
-          <p:nvPr>
-            <p:ph type="ftr" sz="quarter" idx="49"/>
-          </p:nvPr>
-        </p:nvSpPr>
-        <p:spPr/>
-        <p:txBody>
-          <a:bodyPr/>
-          <a:lstStyle/>
-          <a:p>
-            <a:r>
-              <a:rPr lang="en-US" noProof="0"/>
-              <a:t>Presentation Title</a:t>
-            </a:r>
-            <a:endParaRPr lang="en-US" noProof="0" dirty="0"/>
-          </a:p>
-        </p:txBody>
-      </p:sp>
       <p:pic>
         <p:nvPicPr>
-          <p:cNvPr id="8" name="Picture 7">
-            <a:extLst>
-              <a:ext uri="{FF2B5EF4-FFF2-40B4-BE49-F238E27FC236}">
-                <a16:creationId xmlns:a16="http://schemas.microsoft.com/office/drawing/2014/main" id="{0A59F1B3-DBCB-E6BB-4A66-DCBE8E5CD57E}"/>
+          <p:cNvPr id="9" name="Picture 8">
+            <a:extLst>
+              <a:ext uri="{FF2B5EF4-FFF2-40B4-BE49-F238E27FC236}">
+                <a16:creationId xmlns:a16="http://schemas.microsoft.com/office/drawing/2014/main" id="{A5EE42C2-28DB-E062-F4BD-336B9EEA1FC1}"/>
               </a:ext>
             </a:extLst>
           </p:cNvPr>
@@ -28362,62 +28722,10 @@
           </a:prstGeom>
         </p:spPr>
       </p:pic>
-      <p:sp>
-        <p:nvSpPr>
-          <p:cNvPr id="9" name="Rectangle: Rounded Corners 8">
-            <a:extLst>
-              <a:ext uri="{FF2B5EF4-FFF2-40B4-BE49-F238E27FC236}">
-                <a16:creationId xmlns:a16="http://schemas.microsoft.com/office/drawing/2014/main" id="{E5D3AEF8-3485-3EBD-1F2D-8D202841E56D}"/>
-              </a:ext>
-            </a:extLst>
-          </p:cNvPr>
-          <p:cNvSpPr/>
-          <p:nvPr/>
-        </p:nvSpPr>
-        <p:spPr>
-          <a:xfrm>
-            <a:off x="3390549" y="1263048"/>
-            <a:ext cx="536135" cy="655320"/>
-          </a:xfrm>
-          <a:prstGeom prst="roundRect">
-            <a:avLst/>
-          </a:prstGeom>
-          <a:noFill/>
-          <a:ln w="12700">
-            <a:solidFill>
-              <a:srgbClr val="00B050"/>
-            </a:solidFill>
-          </a:ln>
-        </p:spPr>
-        <p:style>
-          <a:lnRef idx="2">
-            <a:schemeClr val="accent1">
-              <a:shade val="15000"/>
-            </a:schemeClr>
-          </a:lnRef>
-          <a:fillRef idx="1">
-            <a:schemeClr val="accent1"/>
-          </a:fillRef>
-          <a:effectRef idx="0">
-            <a:schemeClr val="accent1"/>
-          </a:effectRef>
-          <a:fontRef idx="minor">
-            <a:schemeClr val="lt1"/>
-          </a:fontRef>
-        </p:style>
-        <p:txBody>
-          <a:bodyPr rtlCol="0" anchor="ctr"/>
-          <a:lstStyle/>
-          <a:p>
-            <a:pPr algn="ctr"/>
-            <a:endParaRPr lang="en-SG" dirty="0"/>
-          </a:p>
-        </p:txBody>
-      </p:sp>
     </p:spTree>
     <p:extLst>
       <p:ext uri="{BB962C8B-B14F-4D97-AF65-F5344CB8AC3E}">
-        <p14:creationId xmlns:p14="http://schemas.microsoft.com/office/powerpoint/2010/main" val="3169333057"/>
+        <p14:creationId xmlns:p14="http://schemas.microsoft.com/office/powerpoint/2010/main" val="2591614879"/>
       </p:ext>
     </p:extLst>
   </p:cSld>
@@ -29244,6 +29552,15 @@
 </file>
 
 <file path=customXml/item1.xml><?xml version="1.0" encoding="utf-8"?>
+<?mso-contentType ?>
+<FormTemplates xmlns="http://schemas.microsoft.com/sharepoint/v3/contenttype/forms">
+  <Display>DocumentLibraryForm</Display>
+  <Edit>DocumentLibraryForm</Edit>
+  <New>DocumentLibraryForm</New>
+</FormTemplates>
+</file>
+
+<file path=customXml/item2.xml><?xml version="1.0" encoding="utf-8"?>
 <ct:contentTypeSchema xmlns:ct="http://schemas.microsoft.com/office/2006/metadata/contentType" xmlns:ma="http://schemas.microsoft.com/office/2006/metadata/properties/metaAttributes" ct:_="" ma:_="" ma:contentTypeName="Document" ma:contentTypeID="0x01010079F111ED35F8CC479449609E8A0923A6" ma:contentTypeVersion="28" ma:contentTypeDescription="Create a new document." ma:contentTypeScope="" ma:versionID="60f5a4f2d2b0abadcf532d48ebf9cb71">
   <xsd:schema xmlns:xsd="http://www.w3.org/2001/XMLSchema" xmlns:xs="http://www.w3.org/2001/XMLSchema" xmlns:p="http://schemas.microsoft.com/office/2006/metadata/properties" xmlns:ns1="http://schemas.microsoft.com/sharepoint/v3" xmlns:ns2="71af3243-3dd4-4a8d-8c0d-dd76da1f02a5" xmlns:ns3="16c05727-aa75-4e4a-9b5f-8a80a1165891" xmlns:ns4="230e9df3-be65-4c73-a93b-d1236ebd677e" targetNamespace="http://schemas.microsoft.com/office/2006/metadata/properties" ma:root="true" ma:fieldsID="7dd78129e6a1811f84807ad11c651531" ns1:_="" ns2:_="" ns3:_="" ns4:_="">
     <xsd:import namespace="http://schemas.microsoft.com/sharepoint/v3"/>
@@ -29555,15 +29872,6 @@
 </ct:contentTypeSchema>
 </file>
 
-<file path=customXml/item2.xml><?xml version="1.0" encoding="utf-8"?>
-<?mso-contentType ?>
-<FormTemplates xmlns="http://schemas.microsoft.com/sharepoint/v3/contenttype/forms">
-  <Display>DocumentLibraryForm</Display>
-  <Edit>DocumentLibraryForm</Edit>
-  <New>DocumentLibraryForm</New>
-</FormTemplates>
-</file>
-
 <file path=customXml/item3.xml><?xml version="1.0" encoding="utf-8"?>
 <p:properties xmlns:p="http://schemas.microsoft.com/office/2006/metadata/properties" xmlns:xsi="http://www.w3.org/2001/XMLSchema-instance" xmlns:pc="http://schemas.microsoft.com/office/infopath/2007/PartnerControls">
   <documentManagement>
@@ -29585,6 +29893,14 @@
 </file>
 
 <file path=customXml/itemProps1.xml><?xml version="1.0" encoding="utf-8"?>
+<ds:datastoreItem xmlns:ds="http://schemas.openxmlformats.org/officeDocument/2006/customXml" ds:itemID="{F8C25491-3B09-4F3E-8C86-936D290E4013}">
+  <ds:schemaRefs>
+    <ds:schemaRef ds:uri="http://schemas.microsoft.com/sharepoint/v3/contenttype/forms"/>
+  </ds:schemaRefs>
+</ds:datastoreItem>
+</file>
+
+<file path=customXml/itemProps2.xml><?xml version="1.0" encoding="utf-8"?>
 <ds:datastoreItem xmlns:ds="http://schemas.openxmlformats.org/officeDocument/2006/customXml" ds:itemID="{337AE0CD-4570-4F66-89CD-DDD19F091E8D}">
   <ds:schemaRefs>
     <ds:schemaRef ds:uri="http://schemas.microsoft.com/office/2006/metadata/contentType"/>
@@ -29605,14 +29921,6 @@
 </ds:datastoreItem>
 </file>
 
-<file path=customXml/itemProps2.xml><?xml version="1.0" encoding="utf-8"?>
-<ds:datastoreItem xmlns:ds="http://schemas.openxmlformats.org/officeDocument/2006/customXml" ds:itemID="{F8C25491-3B09-4F3E-8C86-936D290E4013}">
-  <ds:schemaRefs>
-    <ds:schemaRef ds:uri="http://schemas.microsoft.com/sharepoint/v3/contenttype/forms"/>
-  </ds:schemaRefs>
-</ds:datastoreItem>
-</file>
-
 <file path=customXml/itemProps3.xml><?xml version="1.0" encoding="utf-8"?>
 <ds:datastoreItem xmlns:ds="http://schemas.openxmlformats.org/officeDocument/2006/customXml" ds:itemID="{F4D5854E-F453-4846-A87D-6EF3DCF73E3E}">
   <ds:schemaRefs>

</xml_diff>